<commit_message>
Fixing differences between Windows and OSX
</commit_message>
<xml_diff>
--- a/Content/Introduction/Azure Overview.pptx
+++ b/Content/Introduction/Azure Overview.pptx
@@ -254,7 +254,7 @@
           <a:p>
             <a:fld id="{2E5CA586-3557-4985-BCD4-35EF5AC8B4A4}" type="datetimeFigureOut">
               <a:rPr lang="en-US" smtClean="0"/>
-              <a:t>10/2/15</a:t>
+              <a:t>10/6/2015</a:t>
             </a:fld>
             <a:endParaRPr lang="en-US"/>
           </a:p>
@@ -921,7 +921,7 @@
           <a:p>
             <a:fld id="{BC60BE34-BC89-4C98-A56B-79B7A098D024}" type="slidenum">
               <a:rPr lang="en-US" smtClean="0"/>
-              <a:t>12</a:t>
+              <a:t>11</a:t>
             </a:fld>
             <a:endParaRPr lang="en-US"/>
           </a:p>
@@ -930,7 +930,7 @@
     </p:spTree>
     <p:extLst>
       <p:ext uri="{BB962C8B-B14F-4D97-AF65-F5344CB8AC3E}">
-        <p14:creationId xmlns:p14="http://schemas.microsoft.com/office/powerpoint/2010/main" val="609764103"/>
+        <p14:creationId xmlns:p14="http://schemas.microsoft.com/office/powerpoint/2010/main" val="1390819240"/>
       </p:ext>
     </p:extLst>
   </p:cSld>
@@ -984,6 +984,90 @@
           <a:bodyPr/>
           <a:lstStyle/>
           <a:p>
+            <a:endParaRPr lang="en-US" dirty="0"/>
+          </a:p>
+        </p:txBody>
+      </p:sp>
+      <p:sp>
+        <p:nvSpPr>
+          <p:cNvPr id="4" name="Slide Number Placeholder 3"/>
+          <p:cNvSpPr>
+            <a:spLocks noGrp="1"/>
+          </p:cNvSpPr>
+          <p:nvPr>
+            <p:ph type="sldNum" sz="quarter" idx="10"/>
+          </p:nvPr>
+        </p:nvSpPr>
+        <p:spPr/>
+        <p:txBody>
+          <a:bodyPr/>
+          <a:lstStyle/>
+          <a:p>
+            <a:fld id="{BC60BE34-BC89-4C98-A56B-79B7A098D024}" type="slidenum">
+              <a:rPr lang="en-US" smtClean="0"/>
+              <a:t>12</a:t>
+            </a:fld>
+            <a:endParaRPr lang="en-US"/>
+          </a:p>
+        </p:txBody>
+      </p:sp>
+    </p:spTree>
+    <p:extLst>
+      <p:ext uri="{BB962C8B-B14F-4D97-AF65-F5344CB8AC3E}">
+        <p14:creationId xmlns:p14="http://schemas.microsoft.com/office/powerpoint/2010/main" val="609764103"/>
+      </p:ext>
+    </p:extLst>
+  </p:cSld>
+  <p:clrMapOvr>
+    <a:masterClrMapping/>
+  </p:clrMapOvr>
+</p:notes>
+</file>
+
+<file path=ppt/notesSlides/notesSlide6.xml><?xml version="1.0" encoding="utf-8"?>
+<p:notes xmlns:a="http://schemas.openxmlformats.org/drawingml/2006/main" xmlns:r="http://schemas.openxmlformats.org/officeDocument/2006/relationships" xmlns:p="http://schemas.openxmlformats.org/presentationml/2006/main">
+  <p:cSld>
+    <p:spTree>
+      <p:nvGrpSpPr>
+        <p:cNvPr id="1" name=""/>
+        <p:cNvGrpSpPr/>
+        <p:nvPr/>
+      </p:nvGrpSpPr>
+      <p:grpSpPr>
+        <a:xfrm>
+          <a:off x="0" y="0"/>
+          <a:ext cx="0" cy="0"/>
+          <a:chOff x="0" y="0"/>
+          <a:chExt cx="0" cy="0"/>
+        </a:xfrm>
+      </p:grpSpPr>
+      <p:sp>
+        <p:nvSpPr>
+          <p:cNvPr id="2" name="Slide Image Placeholder 1"/>
+          <p:cNvSpPr>
+            <a:spLocks noGrp="1" noRot="1" noChangeAspect="1"/>
+          </p:cNvSpPr>
+          <p:nvPr>
+            <p:ph type="sldImg"/>
+          </p:nvPr>
+        </p:nvSpPr>
+        <p:spPr/>
+      </p:sp>
+      <p:sp>
+        <p:nvSpPr>
+          <p:cNvPr id="3" name="Notes Placeholder 2"/>
+          <p:cNvSpPr>
+            <a:spLocks noGrp="1"/>
+          </p:cNvSpPr>
+          <p:nvPr>
+            <p:ph type="body" idx="1"/>
+          </p:nvPr>
+        </p:nvSpPr>
+        <p:spPr/>
+        <p:txBody>
+          <a:bodyPr/>
+          <a:lstStyle/>
+          <a:p>
             <a:r>
               <a:rPr lang="en-US" dirty="0" smtClean="0"/>
               <a:t>Only pay for what you can use is critical to researchers. Many are trying to set up clusters and do not want the issue of managing it or giving up student cycle to manage it. That's time away from research.</a:t>
@@ -1028,7 +1112,7 @@
 </p:notes>
 </file>
 
-<file path=ppt/notesSlides/notesSlide6.xml><?xml version="1.0" encoding="utf-8"?>
+<file path=ppt/notesSlides/notesSlide7.xml><?xml version="1.0" encoding="utf-8"?>
 <p:notes xmlns:a="http://schemas.openxmlformats.org/drawingml/2006/main" xmlns:r="http://schemas.openxmlformats.org/officeDocument/2006/relationships" xmlns:p="http://schemas.openxmlformats.org/presentationml/2006/main">
   <p:cSld>
     <p:spTree>
@@ -17768,10 +17852,10 @@
         </p:nvGrpSpPr>
         <p:grpSpPr>
           <a:xfrm>
-            <a:off x="69435" y="993796"/>
-            <a:ext cx="3782992" cy="2113974"/>
-            <a:chOff x="69453" y="993162"/>
-            <a:chExt cx="3783977" cy="2114525"/>
+            <a:off x="69435" y="1052273"/>
+            <a:ext cx="3782992" cy="2055497"/>
+            <a:chOff x="69453" y="1051654"/>
+            <a:chExt cx="3783977" cy="2056033"/>
           </a:xfrm>
         </p:grpSpPr>
         <p:sp>
@@ -17824,8 +17908,8 @@
           </p:nvSpPr>
           <p:spPr>
             <a:xfrm>
-              <a:off x="69453" y="993162"/>
-              <a:ext cx="3679529" cy="1496184"/>
+              <a:off x="69453" y="1051654"/>
+              <a:ext cx="3679529" cy="1379198"/>
             </a:xfrm>
             <a:prstGeom prst="rect">
               <a:avLst/>
@@ -17844,7 +17928,7 @@
                 <a:buSzPct val="90000"/>
               </a:pPr>
               <a:r>
-                <a:rPr lang="en-US" sz="9600" dirty="0" smtClean="0">
+                <a:rPr lang="en-US" sz="8800" dirty="0" smtClean="0">
                   <a:solidFill>
                     <a:srgbClr val="00B0F0"/>
                   </a:solidFill>
@@ -17853,7 +17937,7 @@
                 </a:rPr>
                 <a:t>&gt;500m</a:t>
               </a:r>
-              <a:endParaRPr lang="en-US" sz="9600" dirty="0">
+              <a:endParaRPr lang="en-US" sz="8800" dirty="0">
                 <a:solidFill>
                   <a:srgbClr val="00B0F0"/>
                 </a:solidFill>
@@ -18221,10 +18305,10 @@
         </p:nvGrpSpPr>
         <p:grpSpPr>
           <a:xfrm>
-            <a:off x="-97875" y="3685626"/>
-            <a:ext cx="3909025" cy="1495794"/>
-            <a:chOff x="3993501" y="3685694"/>
-            <a:chExt cx="3910044" cy="1496183"/>
+            <a:off x="-97875" y="3743001"/>
+            <a:ext cx="3909025" cy="1438419"/>
+            <a:chOff x="3993501" y="3743084"/>
+            <a:chExt cx="3910044" cy="1438793"/>
           </a:xfrm>
         </p:grpSpPr>
         <p:sp>
@@ -18235,8 +18319,8 @@
           </p:nvSpPr>
           <p:spPr>
             <a:xfrm>
-              <a:off x="3993501" y="3685694"/>
-              <a:ext cx="2578224" cy="1496183"/>
+              <a:off x="3993501" y="3802679"/>
+              <a:ext cx="2578224" cy="1379198"/>
             </a:xfrm>
             <a:prstGeom prst="rect">
               <a:avLst/>
@@ -18255,7 +18339,7 @@
                 <a:buSzPct val="90000"/>
               </a:pPr>
               <a:r>
-                <a:rPr lang="en-US" sz="9600" spc="-294" dirty="0" smtClean="0">
+                <a:rPr lang="en-US" sz="8800" spc="-294" dirty="0" smtClean="0">
                   <a:solidFill>
                     <a:srgbClr val="00B0F0"/>
                   </a:solidFill>
@@ -18264,7 +18348,7 @@
                 </a:rPr>
                 <a:t>&gt;777</a:t>
               </a:r>
-              <a:endParaRPr lang="en-US" sz="8800" dirty="0">
+              <a:endParaRPr lang="en-US" sz="8000" dirty="0">
                 <a:solidFill>
                   <a:srgbClr val="00B0F0"/>
                 </a:solidFill>
@@ -18393,10 +18477,10 @@
         </p:nvGrpSpPr>
         <p:grpSpPr>
           <a:xfrm>
-            <a:off x="4004791" y="3692091"/>
-            <a:ext cx="4667028" cy="1446579"/>
-            <a:chOff x="8097236" y="3692159"/>
-            <a:chExt cx="4668244" cy="1446956"/>
+            <a:off x="4004791" y="3750403"/>
+            <a:ext cx="4667028" cy="1388266"/>
+            <a:chOff x="8097236" y="3750487"/>
+            <a:chExt cx="4668244" cy="1388628"/>
           </a:xfrm>
         </p:grpSpPr>
         <p:grpSp>
@@ -18407,10 +18491,10 @@
           </p:nvGrpSpPr>
           <p:grpSpPr>
             <a:xfrm>
-              <a:off x="8097236" y="3692159"/>
-              <a:ext cx="4668244" cy="1446956"/>
-              <a:chOff x="8097236" y="3692159"/>
-              <a:chExt cx="4668244" cy="1446956"/>
+              <a:off x="8097236" y="3750487"/>
+              <a:ext cx="4668244" cy="1388628"/>
+              <a:chOff x="8097236" y="3750487"/>
+              <a:chExt cx="4668244" cy="1388628"/>
             </a:xfrm>
           </p:grpSpPr>
           <p:cxnSp>
@@ -18457,8 +18541,8 @@
             </p:nvSpPr>
             <p:spPr>
               <a:xfrm>
-                <a:off x="8249298" y="3692159"/>
-                <a:ext cx="2492813" cy="1261884"/>
+                <a:off x="8249298" y="3750487"/>
+                <a:ext cx="2492813" cy="1145227"/>
               </a:xfrm>
               <a:prstGeom prst="rect">
                 <a:avLst/>
@@ -18477,7 +18561,7 @@
                   <a:buSzPct val="90000"/>
                 </a:pPr>
                 <a:r>
-                  <a:rPr lang="en-US" sz="7998" dirty="0" smtClean="0">
+                  <a:rPr lang="en-US" sz="7200" dirty="0" smtClean="0">
                     <a:solidFill>
                       <a:srgbClr val="00B0F0"/>
                     </a:solidFill>
@@ -18486,7 +18570,7 @@
                   </a:rPr>
                   <a:t>&gt;80%</a:t>
                 </a:r>
-                <a:endParaRPr lang="en-US" sz="7998" dirty="0">
+                <a:endParaRPr lang="en-US" sz="7200" dirty="0">
                   <a:solidFill>
                     <a:srgbClr val="00B0F0"/>
                   </a:solidFill>
@@ -19229,7 +19313,7 @@
         <p:spPr>
           <a:xfrm>
             <a:off x="519248" y="1447800"/>
-            <a:ext cx="11151916" cy="5046253"/>
+            <a:ext cx="11151916" cy="5876993"/>
           </a:xfrm>
         </p:spPr>
         <p:txBody>
@@ -19269,8 +19353,20 @@
           <a:p>
             <a:r>
               <a:rPr lang="en-US" dirty="0" smtClean="0"/>
-              <a:t>Multiple national government compliance</a:t>
-            </a:r>
+              <a:t>Multiple national government </a:t>
+            </a:r>
+            <a:r>
+              <a:rPr lang="en-US" dirty="0" smtClean="0"/>
+              <a:t/>
+            </a:r>
+            <a:br>
+              <a:rPr lang="en-US" dirty="0" smtClean="0"/>
+            </a:br>
+            <a:r>
+              <a:rPr lang="en-US" dirty="0" smtClean="0"/>
+              <a:t>compliance</a:t>
+            </a:r>
+            <a:endParaRPr lang="en-US" dirty="0" smtClean="0"/>
           </a:p>
           <a:p>
             <a:r>
@@ -19349,6 +19445,13 @@
   <p:transition>
     <p:fade/>
   </p:transition>
+  <p:timing>
+    <p:tnLst>
+      <p:par>
+        <p:cTn id="1" dur="indefinite" restart="never" nodeType="tmRoot"/>
+      </p:par>
+    </p:tnLst>
+  </p:timing>
 </p:sld>
 </file>
 
@@ -19992,7 +20095,19 @@
             <a:pPr lvl="1"/>
             <a:r>
               <a:rPr lang="en-US" dirty="0" smtClean="0"/>
-              <a:t>If you reboot, all changes and data stored the disk</a:t>
+              <a:t>If you reboot, all changes and data </a:t>
+            </a:r>
+            <a:r>
+              <a:rPr lang="en-US" smtClean="0"/>
+              <a:t>stored </a:t>
+            </a:r>
+            <a:r>
+              <a:rPr lang="en-US" smtClean="0"/>
+              <a:t>on </a:t>
+            </a:r>
+            <a:r>
+              <a:rPr lang="en-US" dirty="0" smtClean="0"/>
+              <a:t>disk</a:t>
             </a:r>
           </a:p>
           <a:p>
@@ -28246,15 +28361,7 @@
             <a:pPr lvl="1"/>
             <a:r>
               <a:rPr lang="en-US" dirty="0" smtClean="0"/>
-              <a:t>U. of TX, Austin, U. of CA, &amp; </a:t>
-            </a:r>
-            <a:r>
-              <a:rPr lang="en-US" dirty="0" smtClean="0"/>
-              <a:t>U. </a:t>
-            </a:r>
-            <a:r>
-              <a:rPr lang="en-US" dirty="0" smtClean="0"/>
-              <a:t>of IL, Urbana-Champaign</a:t>
+              <a:t>U. of TX, Austin, U. of CA, &amp; U. of IL, Urbana-Champaign</a:t>
             </a:r>
           </a:p>
           <a:p>
@@ -28385,11 +28492,7 @@
             </a:r>
             <a:r>
               <a:rPr lang="en-US" dirty="0" smtClean="0"/>
-              <a:t>: </a:t>
-            </a:r>
-            <a:r>
-              <a:rPr lang="en-US" dirty="0" smtClean="0"/>
-              <a:t>Clouds against Disease</a:t>
+              <a:t>: Clouds against Disease</a:t>
             </a:r>
           </a:p>
           <a:p>

</xml_diff>

<commit_message>
Incorporating Jeff's awesome changes
</commit_message>
<xml_diff>
--- a/Content/Introduction/Azure Overview.pptx
+++ b/Content/Introduction/Azure Overview.pptx
@@ -5,7 +5,7 @@
     <p:sldMasterId id="2147483680" r:id="rId1"/>
   </p:sldMasterIdLst>
   <p:notesMasterIdLst>
-    <p:notesMasterId r:id="rId21"/>
+    <p:notesMasterId r:id="rId19"/>
   </p:notesMasterIdLst>
   <p:sldIdLst>
     <p:sldId id="256" r:id="rId2"/>
@@ -21,12 +21,10 @@
     <p:sldId id="266" r:id="rId12"/>
     <p:sldId id="281" r:id="rId13"/>
     <p:sldId id="268" r:id="rId14"/>
-    <p:sldId id="277" r:id="rId15"/>
+    <p:sldId id="282" r:id="rId15"/>
     <p:sldId id="269" r:id="rId16"/>
-    <p:sldId id="270" r:id="rId17"/>
-    <p:sldId id="274" r:id="rId18"/>
-    <p:sldId id="275" r:id="rId19"/>
-    <p:sldId id="276" r:id="rId20"/>
+    <p:sldId id="275" r:id="rId17"/>
+    <p:sldId id="276" r:id="rId18"/>
   </p:sldIdLst>
   <p:sldSz cx="12192000" cy="6858000"/>
   <p:notesSz cx="6858000" cy="9144000"/>
@@ -147,18 +145,8 @@
             <p14:sldId id="266"/>
             <p14:sldId id="281"/>
             <p14:sldId id="268"/>
-            <p14:sldId id="277"/>
+            <p14:sldId id="282"/>
             <p14:sldId id="269"/>
-          </p14:sldIdLst>
-        </p14:section>
-        <p14:section name="Virtual Machines" id="{9F16258F-EA8A-4342-A0C1-F0AA826AA43B}">
-          <p14:sldIdLst>
-            <p14:sldId id="270"/>
-          </p14:sldIdLst>
-        </p14:section>
-        <p14:section name="Azure Services" id="{D6079F12-6B9E-B648-93BA-5ADDB27F5A7B}">
-          <p14:sldIdLst>
-            <p14:sldId id="274"/>
             <p14:sldId id="275"/>
             <p14:sldId id="276"/>
           </p14:sldIdLst>
@@ -254,7 +242,7 @@
           <a:p>
             <a:fld id="{2E5CA586-3557-4985-BCD4-35EF5AC8B4A4}" type="datetimeFigureOut">
               <a:rPr lang="en-US" smtClean="0"/>
-              <a:t>10/6/2015</a:t>
+              <a:t>10/7/2015</a:t>
             </a:fld>
             <a:endParaRPr lang="en-US"/>
           </a:p>
@@ -803,6 +791,90 @@
           <a:bodyPr/>
           <a:lstStyle/>
           <a:p>
+            <a:endParaRPr lang="en-US" dirty="0"/>
+          </a:p>
+        </p:txBody>
+      </p:sp>
+      <p:sp>
+        <p:nvSpPr>
+          <p:cNvPr id="4" name="Slide Number Placeholder 3"/>
+          <p:cNvSpPr>
+            <a:spLocks noGrp="1"/>
+          </p:cNvSpPr>
+          <p:nvPr>
+            <p:ph type="sldNum" sz="quarter" idx="10"/>
+          </p:nvPr>
+        </p:nvSpPr>
+        <p:spPr/>
+        <p:txBody>
+          <a:bodyPr/>
+          <a:lstStyle/>
+          <a:p>
+            <a:fld id="{BC60BE34-BC89-4C98-A56B-79B7A098D024}" type="slidenum">
+              <a:rPr lang="en-US" smtClean="0"/>
+              <a:t>8</a:t>
+            </a:fld>
+            <a:endParaRPr lang="en-US"/>
+          </a:p>
+        </p:txBody>
+      </p:sp>
+    </p:spTree>
+    <p:extLst>
+      <p:ext uri="{BB962C8B-B14F-4D97-AF65-F5344CB8AC3E}">
+        <p14:creationId xmlns:p14="http://schemas.microsoft.com/office/powerpoint/2010/main" val="1299263746"/>
+      </p:ext>
+    </p:extLst>
+  </p:cSld>
+  <p:clrMapOvr>
+    <a:masterClrMapping/>
+  </p:clrMapOvr>
+</p:notes>
+</file>
+
+<file path=ppt/notesSlides/notesSlide4.xml><?xml version="1.0" encoding="utf-8"?>
+<p:notes xmlns:a="http://schemas.openxmlformats.org/drawingml/2006/main" xmlns:r="http://schemas.openxmlformats.org/officeDocument/2006/relationships" xmlns:p="http://schemas.openxmlformats.org/presentationml/2006/main">
+  <p:cSld>
+    <p:spTree>
+      <p:nvGrpSpPr>
+        <p:cNvPr id="1" name=""/>
+        <p:cNvGrpSpPr/>
+        <p:nvPr/>
+      </p:nvGrpSpPr>
+      <p:grpSpPr>
+        <a:xfrm>
+          <a:off x="0" y="0"/>
+          <a:ext cx="0" cy="0"/>
+          <a:chOff x="0" y="0"/>
+          <a:chExt cx="0" cy="0"/>
+        </a:xfrm>
+      </p:grpSpPr>
+      <p:sp>
+        <p:nvSpPr>
+          <p:cNvPr id="2" name="Slide Image Placeholder 1"/>
+          <p:cNvSpPr>
+            <a:spLocks noGrp="1" noRot="1" noChangeAspect="1"/>
+          </p:cNvSpPr>
+          <p:nvPr>
+            <p:ph type="sldImg"/>
+          </p:nvPr>
+        </p:nvSpPr>
+        <p:spPr/>
+      </p:sp>
+      <p:sp>
+        <p:nvSpPr>
+          <p:cNvPr id="3" name="Notes Placeholder 2"/>
+          <p:cNvSpPr>
+            <a:spLocks noGrp="1"/>
+          </p:cNvSpPr>
+          <p:nvPr>
+            <p:ph type="body" idx="1"/>
+          </p:nvPr>
+        </p:nvSpPr>
+        <p:spPr/>
+        <p:txBody>
+          <a:bodyPr/>
+          <a:lstStyle/>
+          <a:p>
             <a:r>
               <a:rPr lang="en-US" b="0" dirty="0" smtClean="0"/>
               <a:t>Prepare to be asked about U.S. jurisdiction over international data centers; compare to Gmail if they “get grumpy” and don’t want to use Azure for this reason</a:t>
@@ -856,7 +928,7 @@
 </p:notes>
 </file>
 
-<file path=ppt/notesSlides/notesSlide4.xml><?xml version="1.0" encoding="utf-8"?>
+<file path=ppt/notesSlides/notesSlide5.xml><?xml version="1.0" encoding="utf-8"?>
 <p:notes xmlns:a="http://schemas.openxmlformats.org/drawingml/2006/main" xmlns:r="http://schemas.openxmlformats.org/officeDocument/2006/relationships" xmlns:p="http://schemas.openxmlformats.org/presentationml/2006/main">
   <p:cSld>
     <p:spTree>
@@ -940,7 +1012,7 @@
 </p:notes>
 </file>
 
-<file path=ppt/notesSlides/notesSlide5.xml><?xml version="1.0" encoding="utf-8"?>
+<file path=ppt/notesSlides/notesSlide6.xml><?xml version="1.0" encoding="utf-8"?>
 <p:notes xmlns:a="http://schemas.openxmlformats.org/drawingml/2006/main" xmlns:r="http://schemas.openxmlformats.org/officeDocument/2006/relationships" xmlns:p="http://schemas.openxmlformats.org/presentationml/2006/main">
   <p:cSld>
     <p:spTree>
@@ -1024,94 +1096,6 @@
 </p:notes>
 </file>
 
-<file path=ppt/notesSlides/notesSlide6.xml><?xml version="1.0" encoding="utf-8"?>
-<p:notes xmlns:a="http://schemas.openxmlformats.org/drawingml/2006/main" xmlns:r="http://schemas.openxmlformats.org/officeDocument/2006/relationships" xmlns:p="http://schemas.openxmlformats.org/presentationml/2006/main">
-  <p:cSld>
-    <p:spTree>
-      <p:nvGrpSpPr>
-        <p:cNvPr id="1" name=""/>
-        <p:cNvGrpSpPr/>
-        <p:nvPr/>
-      </p:nvGrpSpPr>
-      <p:grpSpPr>
-        <a:xfrm>
-          <a:off x="0" y="0"/>
-          <a:ext cx="0" cy="0"/>
-          <a:chOff x="0" y="0"/>
-          <a:chExt cx="0" cy="0"/>
-        </a:xfrm>
-      </p:grpSpPr>
-      <p:sp>
-        <p:nvSpPr>
-          <p:cNvPr id="2" name="Slide Image Placeholder 1"/>
-          <p:cNvSpPr>
-            <a:spLocks noGrp="1" noRot="1" noChangeAspect="1"/>
-          </p:cNvSpPr>
-          <p:nvPr>
-            <p:ph type="sldImg"/>
-          </p:nvPr>
-        </p:nvSpPr>
-        <p:spPr/>
-      </p:sp>
-      <p:sp>
-        <p:nvSpPr>
-          <p:cNvPr id="3" name="Notes Placeholder 2"/>
-          <p:cNvSpPr>
-            <a:spLocks noGrp="1"/>
-          </p:cNvSpPr>
-          <p:nvPr>
-            <p:ph type="body" idx="1"/>
-          </p:nvPr>
-        </p:nvSpPr>
-        <p:spPr/>
-        <p:txBody>
-          <a:bodyPr/>
-          <a:lstStyle/>
-          <a:p>
-            <a:r>
-              <a:rPr lang="en-US" dirty="0" smtClean="0"/>
-              <a:t>Only pay for what you can use is critical to researchers. Many are trying to set up clusters and do not want the issue of managing it or giving up student cycle to manage it. That's time away from research.</a:t>
-            </a:r>
-            <a:endParaRPr lang="en-US" dirty="0"/>
-          </a:p>
-        </p:txBody>
-      </p:sp>
-      <p:sp>
-        <p:nvSpPr>
-          <p:cNvPr id="4" name="Slide Number Placeholder 3"/>
-          <p:cNvSpPr>
-            <a:spLocks noGrp="1"/>
-          </p:cNvSpPr>
-          <p:nvPr>
-            <p:ph type="sldNum" sz="quarter" idx="10"/>
-          </p:nvPr>
-        </p:nvSpPr>
-        <p:spPr/>
-        <p:txBody>
-          <a:bodyPr/>
-          <a:lstStyle/>
-          <a:p>
-            <a:fld id="{BC60BE34-BC89-4C98-A56B-79B7A098D024}" type="slidenum">
-              <a:rPr lang="en-US" smtClean="0"/>
-              <a:t>14</a:t>
-            </a:fld>
-            <a:endParaRPr lang="en-US"/>
-          </a:p>
-        </p:txBody>
-      </p:sp>
-    </p:spTree>
-    <p:extLst>
-      <p:ext uri="{BB962C8B-B14F-4D97-AF65-F5344CB8AC3E}">
-        <p14:creationId xmlns:p14="http://schemas.microsoft.com/office/powerpoint/2010/main" val="1447274743"/>
-      </p:ext>
-    </p:extLst>
-  </p:cSld>
-  <p:clrMapOvr>
-    <a:masterClrMapping/>
-  </p:clrMapOvr>
-</p:notes>
-</file>
-
 <file path=ppt/notesSlides/notesSlide7.xml><?xml version="1.0" encoding="utf-8"?>
 <p:notes xmlns:a="http://schemas.openxmlformats.org/drawingml/2006/main" xmlns:r="http://schemas.openxmlformats.org/officeDocument/2006/relationships" xmlns:p="http://schemas.openxmlformats.org/presentationml/2006/main">
   <p:cSld>
@@ -1156,201 +1140,89 @@
           <a:bodyPr/>
           <a:lstStyle/>
           <a:p>
-            <a:pPr marL="0" indent="0">
-              <a:buFont typeface="Arial" pitchFamily="34" charset="0"/>
-              <a:buNone/>
-            </a:pPr>
-            <a:r>
-              <a:rPr lang="en-US" b="1" dirty="0" smtClean="0"/>
-              <a:t>Transition:</a:t>
-            </a:r>
+            <a:endParaRPr lang="en-US" dirty="0"/>
           </a:p>
+        </p:txBody>
+      </p:sp>
+      <p:sp>
+        <p:nvSpPr>
+          <p:cNvPr id="4" name="Slide Number Placeholder 3"/>
+          <p:cNvSpPr>
+            <a:spLocks noGrp="1"/>
+          </p:cNvSpPr>
+          <p:nvPr>
+            <p:ph type="sldNum" sz="quarter" idx="10"/>
+          </p:nvPr>
+        </p:nvSpPr>
+        <p:spPr/>
+        <p:txBody>
+          <a:bodyPr/>
+          <a:lstStyle/>
           <a:p>
-            <a:pPr marL="171450" indent="-171450">
-              <a:buFont typeface="Arial" pitchFamily="34" charset="0"/>
-              <a:buChar char="•"/>
-            </a:pPr>
-            <a:r>
-              <a:rPr lang="en-US" dirty="0" smtClean="0"/>
-              <a:t>For the rest of this</a:t>
-            </a:r>
-            <a:r>
-              <a:rPr lang="en-US" baseline="0" dirty="0" smtClean="0"/>
-              <a:t> talk I’m going to give you a to</a:t>
-            </a:r>
-            <a:r>
-              <a:rPr lang="en-US" dirty="0" smtClean="0"/>
-              <a:t>ur of Microsoft Azure, walk</a:t>
-            </a:r>
-            <a:r>
-              <a:rPr lang="en-US" baseline="0" dirty="0" smtClean="0"/>
-              <a:t> you through many of the </a:t>
-            </a:r>
-            <a:r>
-              <a:rPr lang="en-US" dirty="0" smtClean="0"/>
-              <a:t>features, and ground you in the capabilities</a:t>
-            </a:r>
-            <a:r>
-              <a:rPr lang="en-US" baseline="0" dirty="0" smtClean="0"/>
-              <a:t> it provides</a:t>
-            </a:r>
+            <a:fld id="{BC60BE34-BC89-4C98-A56B-79B7A098D024}" type="slidenum">
+              <a:rPr lang="en-US" smtClean="0"/>
+              <a:t>13</a:t>
+            </a:fld>
+            <a:endParaRPr lang="en-US"/>
           </a:p>
-          <a:p>
-            <a:pPr marL="171450" indent="-171450">
-              <a:buFont typeface="Arial" pitchFamily="34" charset="0"/>
-              <a:buChar char="•"/>
-            </a:pPr>
-            <a:r>
-              <a:rPr lang="en-US" baseline="0" dirty="0" smtClean="0"/>
-              <a:t>The first set of features I want to walk through is Virtual Machines.  </a:t>
-            </a:r>
-          </a:p>
-          <a:p>
-            <a:pPr marL="171450" indent="-171450">
-              <a:buFont typeface="Arial" pitchFamily="34" charset="0"/>
-              <a:buChar char="•"/>
-            </a:pPr>
-            <a:endParaRPr lang="en-US" baseline="0" dirty="0" smtClean="0"/>
-          </a:p>
-          <a:p>
-            <a:pPr marL="0" indent="0">
-              <a:buFont typeface="Arial" pitchFamily="34" charset="0"/>
-              <a:buNone/>
-            </a:pPr>
-            <a:r>
-              <a:rPr lang="en-US" b="1" baseline="0" dirty="0" smtClean="0"/>
-              <a:t>Speaking Points:</a:t>
-            </a:r>
-          </a:p>
-          <a:p>
-            <a:pPr marL="171450" indent="-171450">
-              <a:buFont typeface="Arial" pitchFamily="34" charset="0"/>
-              <a:buChar char="•"/>
-            </a:pPr>
-            <a:r>
-              <a:rPr lang="en-US" baseline="0" dirty="0" smtClean="0"/>
-              <a:t>If you’re familiar with traditional hosting, this is probably the feature that feels most familiar and consistent with what other hosting providers provide.  </a:t>
-            </a:r>
-          </a:p>
-          <a:p>
-            <a:pPr marL="171450" indent="-171450">
-              <a:buFont typeface="Arial" pitchFamily="34" charset="0"/>
-              <a:buChar char="•"/>
-            </a:pPr>
-            <a:r>
-              <a:rPr lang="en-US" baseline="0" dirty="0" smtClean="0"/>
-              <a:t>The ability to stand up a virtual machine with either Windows or Linux that you can basically remote desktop in or SSH in and run any workload.  </a:t>
-            </a:r>
-            <a:endParaRPr lang="en-US" dirty="0" smtClean="0"/>
-          </a:p>
-          <a:p>
-            <a:pPr marL="171450" indent="-171450">
-              <a:buFont typeface="Arial" pitchFamily="34" charset="0"/>
-              <a:buChar char="•"/>
-            </a:pPr>
-            <a:r>
-              <a:rPr lang="en-US" b="0" dirty="0" smtClean="0"/>
-              <a:t>These virtual machines enable you to be admin on the box</a:t>
-            </a:r>
-          </a:p>
-          <a:p>
-            <a:pPr marL="171450" indent="-171450">
-              <a:buFont typeface="Arial" pitchFamily="34" charset="0"/>
-              <a:buChar char="•"/>
-            </a:pPr>
-            <a:r>
-              <a:rPr lang="en-US" b="0" dirty="0" smtClean="0"/>
-              <a:t>They are durable, meaning if you reboot the VM, it</a:t>
-            </a:r>
-            <a:r>
-              <a:rPr lang="en-US" b="0" baseline="0" dirty="0" smtClean="0"/>
-              <a:t> is still there with all of your changes and data you stored to disk</a:t>
-            </a:r>
-          </a:p>
-          <a:p>
-            <a:pPr marL="171450" indent="-171450">
-              <a:buFont typeface="Arial" pitchFamily="34" charset="0"/>
-              <a:buChar char="•"/>
-            </a:pPr>
-            <a:r>
-              <a:rPr lang="en-US" b="0" dirty="0" smtClean="0"/>
-              <a:t>This means you can </a:t>
-            </a:r>
-            <a:r>
-              <a:rPr lang="en-US" b="0" baseline="0" dirty="0" smtClean="0"/>
-              <a:t>run any type of workload</a:t>
-            </a:r>
-          </a:p>
-          <a:p>
-            <a:pPr marL="384431" lvl="1" indent="-171450">
-              <a:buFont typeface="Arial" pitchFamily="34" charset="0"/>
-              <a:buChar char="•"/>
-            </a:pPr>
-            <a:r>
-              <a:rPr lang="en-US" b="0" baseline="0" dirty="0" smtClean="0"/>
-              <a:t>If you want to run SQL you can, if you want to install a no-SQL solution, you can do that to. </a:t>
-            </a:r>
-          </a:p>
-          <a:p>
-            <a:pPr marL="384431" lvl="1" indent="-171450">
-              <a:buFont typeface="Arial" pitchFamily="34" charset="0"/>
-              <a:buChar char="•"/>
-            </a:pPr>
-            <a:r>
-              <a:rPr lang="en-US" b="0" baseline="0" dirty="0" smtClean="0"/>
-              <a:t>If you want to run SharePoint you can do that. </a:t>
-            </a:r>
-          </a:p>
-          <a:p>
-            <a:pPr marL="171450" indent="-171450">
-              <a:buFont typeface="Arial" pitchFamily="34" charset="0"/>
-              <a:buChar char="•"/>
-            </a:pPr>
-            <a:r>
-              <a:rPr lang="en-US" b="0" baseline="0" dirty="0" smtClean="0"/>
-              <a:t>Provides ultimate flexibility to do what you want to do</a:t>
-            </a:r>
-          </a:p>
-          <a:p>
-            <a:pPr marL="171450" indent="-171450">
-              <a:buFont typeface="Arial" pitchFamily="34" charset="0"/>
-              <a:buChar char="•"/>
-            </a:pPr>
-            <a:r>
-              <a:rPr lang="en-US" b="0" baseline="0" dirty="0" smtClean="0"/>
-              <a:t>Also enables you to do what we call virtual private networking</a:t>
-            </a:r>
-          </a:p>
-          <a:p>
-            <a:pPr marL="171450" indent="-171450">
-              <a:buFont typeface="Arial" pitchFamily="34" charset="0"/>
-              <a:buChar char="•"/>
-            </a:pPr>
-            <a:r>
-              <a:rPr lang="en-US" b="0" baseline="0" dirty="0" smtClean="0"/>
-              <a:t>With virtual private networking, you can deploy Virtual Machines in the cloud and group them together so they are part of their own private network</a:t>
-            </a:r>
-          </a:p>
-          <a:p>
-            <a:pPr marL="171450" indent="-171450">
-              <a:buFont typeface="Arial" pitchFamily="34" charset="0"/>
-              <a:buChar char="•"/>
-            </a:pPr>
-            <a:r>
-              <a:rPr lang="en-US" b="0" baseline="0" dirty="0" smtClean="0"/>
-              <a:t>You can also then connect it back to your corporate network (if you have one) and establish a VPN secure tunnel to link your machines running in your own corporate environment up to your virtual machines in the cloud – making them look like they’re all part of one connected network.  </a:t>
-            </a:r>
-          </a:p>
-          <a:p>
-            <a:pPr marL="171450" indent="-171450">
-              <a:buFont typeface="Arial" pitchFamily="34" charset="0"/>
-              <a:buChar char="•"/>
-            </a:pPr>
-            <a:r>
-              <a:rPr lang="en-US" b="0" baseline="0" dirty="0" smtClean="0"/>
-              <a:t>So lots of flexibility in the compute side as well as in the networking side. </a:t>
-            </a:r>
-          </a:p>
+        </p:txBody>
+      </p:sp>
+    </p:spTree>
+    <p:extLst>
+      <p:ext uri="{BB962C8B-B14F-4D97-AF65-F5344CB8AC3E}">
+        <p14:creationId xmlns:p14="http://schemas.microsoft.com/office/powerpoint/2010/main" val="2028363055"/>
+      </p:ext>
+    </p:extLst>
+  </p:cSld>
+  <p:clrMapOvr>
+    <a:masterClrMapping/>
+  </p:clrMapOvr>
+</p:notes>
+</file>
+
+<file path=ppt/notesSlides/notesSlide8.xml><?xml version="1.0" encoding="utf-8"?>
+<p:notes xmlns:a="http://schemas.openxmlformats.org/drawingml/2006/main" xmlns:r="http://schemas.openxmlformats.org/officeDocument/2006/relationships" xmlns:p="http://schemas.openxmlformats.org/presentationml/2006/main">
+  <p:cSld>
+    <p:spTree>
+      <p:nvGrpSpPr>
+        <p:cNvPr id="1" name=""/>
+        <p:cNvGrpSpPr/>
+        <p:nvPr/>
+      </p:nvGrpSpPr>
+      <p:grpSpPr>
+        <a:xfrm>
+          <a:off x="0" y="0"/>
+          <a:ext cx="0" cy="0"/>
+          <a:chOff x="0" y="0"/>
+          <a:chExt cx="0" cy="0"/>
+        </a:xfrm>
+      </p:grpSpPr>
+      <p:sp>
+        <p:nvSpPr>
+          <p:cNvPr id="2" name="Slide Image Placeholder 1"/>
+          <p:cNvSpPr>
+            <a:spLocks noGrp="1" noRot="1" noChangeAspect="1"/>
+          </p:cNvSpPr>
+          <p:nvPr>
+            <p:ph type="sldImg"/>
+          </p:nvPr>
+        </p:nvSpPr>
+        <p:spPr/>
+      </p:sp>
+      <p:sp>
+        <p:nvSpPr>
+          <p:cNvPr id="3" name="Notes Placeholder 2"/>
+          <p:cNvSpPr>
+            <a:spLocks noGrp="1"/>
+          </p:cNvSpPr>
+          <p:nvPr>
+            <p:ph type="body" idx="1"/>
+          </p:nvPr>
+        </p:nvSpPr>
+        <p:spPr/>
+        <p:txBody>
+          <a:bodyPr/>
+          <a:lstStyle/>
           <a:p>
             <a:endParaRPr lang="en-US" dirty="0"/>
           </a:p>
@@ -1373,7 +1245,7 @@
           <a:p>
             <a:fld id="{BC60BE34-BC89-4C98-A56B-79B7A098D024}" type="slidenum">
               <a:rPr lang="en-US" smtClean="0"/>
-              <a:t>16</a:t>
+              <a:t>14</a:t>
             </a:fld>
             <a:endParaRPr lang="en-US"/>
           </a:p>
@@ -1382,7 +1254,7 @@
     </p:spTree>
     <p:extLst>
       <p:ext uri="{BB962C8B-B14F-4D97-AF65-F5344CB8AC3E}">
-        <p14:creationId xmlns:p14="http://schemas.microsoft.com/office/powerpoint/2010/main" val="2011608035"/>
+        <p14:creationId xmlns:p14="http://schemas.microsoft.com/office/powerpoint/2010/main" val="2443964623"/>
       </p:ext>
     </p:extLst>
   </p:cSld>
@@ -18779,7 +18651,7 @@
           <p:spPr>
             <a:xfrm>
               <a:off x="9910351" y="5932986"/>
-              <a:ext cx="2280785" cy="400110"/>
+              <a:ext cx="2280785" cy="369428"/>
             </a:xfrm>
             <a:prstGeom prst="rect">
               <a:avLst/>
@@ -18793,7 +18665,7 @@
             <a:lstStyle/>
             <a:p>
               <a:r>
-                <a:rPr lang="en-US" sz="1999" dirty="0" smtClean="0">
+                <a:rPr lang="en-US" dirty="0" smtClean="0">
                   <a:solidFill>
                     <a:srgbClr val="00B0F0"/>
                   </a:solidFill>
@@ -18802,7 +18674,7 @@
                 <a:t>authentications/</a:t>
               </a:r>
               <a:r>
-                <a:rPr lang="en-US" sz="1999" dirty="0" err="1" smtClean="0">
+                <a:rPr lang="en-US" dirty="0" err="1" smtClean="0">
                   <a:solidFill>
                     <a:srgbClr val="00B0F0"/>
                   </a:solidFill>
@@ -18810,7 +18682,7 @@
                 </a:rPr>
                 <a:t>wk</a:t>
               </a:r>
-              <a:endParaRPr lang="en-US" sz="1999" dirty="0">
+              <a:endParaRPr lang="en-US" dirty="0">
                 <a:solidFill>
                   <a:srgbClr val="00B0F0"/>
                 </a:solidFill>
@@ -19294,7 +19166,7 @@
           <a:p>
             <a:r>
               <a:rPr lang="en-US" dirty="0" smtClean="0"/>
-              <a:t>Azure’s Focus on Trust</a:t>
+              <a:t>Security and Compliance</a:t>
             </a:r>
             <a:endParaRPr lang="en-US" dirty="0"/>
           </a:p>
@@ -19313,7 +19185,7 @@
         <p:spPr>
           <a:xfrm>
             <a:off x="519248" y="1447800"/>
-            <a:ext cx="11151916" cy="5876993"/>
+            <a:ext cx="7272470" cy="5876993"/>
           </a:xfrm>
         </p:spPr>
         <p:txBody>
@@ -19355,10 +19227,6 @@
               <a:rPr lang="en-US" dirty="0" smtClean="0"/>
               <a:t>Multiple national government </a:t>
             </a:r>
-            <a:r>
-              <a:rPr lang="en-US" dirty="0" smtClean="0"/>
-              <a:t/>
-            </a:r>
             <a:br>
               <a:rPr lang="en-US" dirty="0" smtClean="0"/>
             </a:br>
@@ -19366,7 +19234,6 @@
               <a:rPr lang="en-US" dirty="0" smtClean="0"/>
               <a:t>compliance</a:t>
             </a:r>
-            <a:endParaRPr lang="en-US" dirty="0" smtClean="0"/>
           </a:p>
           <a:p>
             <a:r>
@@ -19424,12 +19291,20 @@
         </p:blipFill>
         <p:spPr>
           <a:xfrm>
-            <a:off x="8214037" y="2484325"/>
-            <a:ext cx="3457127" cy="3869582"/>
+            <a:off x="7522249" y="1447800"/>
+            <a:ext cx="4148917" cy="4643907"/>
           </a:xfrm>
           <a:prstGeom prst="rect">
             <a:avLst/>
           </a:prstGeom>
+          <a:ln>
+            <a:solidFill>
+              <a:schemeClr val="tx1">
+                <a:lumMod val="25000"/>
+                <a:lumOff val="75000"/>
+              </a:schemeClr>
+            </a:solidFill>
+          </a:ln>
         </p:spPr>
       </p:pic>
     </p:spTree>
@@ -19523,7 +19398,11 @@
           <a:p>
             <a:pPr lvl="1"/>
             <a:r>
-              <a:rPr lang="en-US" sz="2000" dirty="0" smtClean="0"/>
+              <a:rPr lang="en-US" sz="2000" dirty="0" smtClean="0">
+                <a:solidFill>
+                  <a:schemeClr val="accent2"/>
+                </a:solidFill>
+              </a:rPr>
               <a:t>Virtual Machines</a:t>
             </a:r>
           </a:p>
@@ -19596,7 +19475,11 @@
           <a:p>
             <a:pPr lvl="1"/>
             <a:r>
-              <a:rPr lang="en-US" sz="2000" dirty="0" smtClean="0"/>
+              <a:rPr lang="en-US" sz="2000" dirty="0" smtClean="0">
+                <a:solidFill>
+                  <a:schemeClr val="accent2"/>
+                </a:solidFill>
+              </a:rPr>
               <a:t>Blob storage</a:t>
             </a:r>
           </a:p>
@@ -19641,30 +19524,59 @@
           <a:p>
             <a:pPr lvl="1"/>
             <a:r>
-              <a:rPr lang="en-US" sz="2000" dirty="0" smtClean="0"/>
+              <a:rPr lang="en-US" sz="2000" dirty="0" smtClean="0">
+                <a:solidFill>
+                  <a:schemeClr val="accent2"/>
+                </a:solidFill>
+              </a:rPr>
               <a:t>HDInsight</a:t>
             </a:r>
           </a:p>
           <a:p>
             <a:pPr lvl="1"/>
             <a:r>
-              <a:rPr lang="en-US" sz="2000" dirty="0" smtClean="0"/>
+              <a:rPr lang="en-US" sz="2000" dirty="0" smtClean="0">
+                <a:solidFill>
+                  <a:schemeClr val="accent2"/>
+                </a:solidFill>
+              </a:rPr>
               <a:t>Machine Learning</a:t>
             </a:r>
           </a:p>
           <a:p>
             <a:pPr lvl="1"/>
             <a:r>
-              <a:rPr lang="en-US" sz="2000" dirty="0" smtClean="0"/>
+              <a:rPr lang="en-US" sz="2000" dirty="0" smtClean="0">
+                <a:solidFill>
+                  <a:schemeClr val="accent2"/>
+                </a:solidFill>
+              </a:rPr>
               <a:t>Stream Analytics</a:t>
             </a:r>
           </a:p>
           <a:p>
             <a:pPr lvl="1"/>
             <a:r>
-              <a:rPr lang="en-US" sz="2000" dirty="0" smtClean="0"/>
-              <a:t>Event Hub</a:t>
+              <a:rPr lang="en-US" sz="2000" dirty="0" smtClean="0">
+                <a:solidFill>
+                  <a:schemeClr val="accent2"/>
+                </a:solidFill>
+              </a:rPr>
+              <a:t>Event </a:t>
             </a:r>
+            <a:r>
+              <a:rPr lang="en-US" sz="2000" dirty="0" smtClean="0">
+                <a:solidFill>
+                  <a:schemeClr val="accent2"/>
+                </a:solidFill>
+              </a:rPr>
+              <a:t>Hubs</a:t>
+            </a:r>
+            <a:endParaRPr lang="en-US" sz="2000" dirty="0" smtClean="0">
+              <a:solidFill>
+                <a:schemeClr val="accent2"/>
+              </a:solidFill>
+            </a:endParaRPr>
           </a:p>
           <a:p>
             <a:r>
@@ -19779,89 +19691,46 @@
           <a:p>
             <a:r>
               <a:rPr lang="en-US" dirty="0" smtClean="0"/>
-              <a:t>Pay </a:t>
-            </a:r>
-            <a:r>
-              <a:rPr lang="en-US" b="1" dirty="0" smtClean="0">
-                <a:solidFill>
-                  <a:srgbClr val="00B0F0"/>
-                </a:solidFill>
-              </a:rPr>
-              <a:t>only</a:t>
-            </a:r>
-            <a:r>
-              <a:rPr lang="en-US" dirty="0" smtClean="0"/>
-              <a:t> for what is used</a:t>
+              <a:t>Azure Services Work Together</a:t>
             </a:r>
             <a:endParaRPr lang="en-US" dirty="0"/>
           </a:p>
         </p:txBody>
       </p:sp>
-      <p:sp>
-        <p:nvSpPr>
-          <p:cNvPr id="3" name="Content Placeholder 2"/>
-          <p:cNvSpPr>
-            <a:spLocks noGrp="1"/>
-          </p:cNvSpPr>
-          <p:nvPr>
-            <p:ph idx="1"/>
-          </p:nvPr>
-        </p:nvSpPr>
+      <p:pic>
+        <p:nvPicPr>
+          <p:cNvPr id="4" name="Picture 3"/>
+          <p:cNvPicPr>
+            <a:picLocks noChangeAspect="1"/>
+          </p:cNvPicPr>
+          <p:nvPr/>
+        </p:nvPicPr>
+        <p:blipFill>
+          <a:blip r:embed="rId3">
+            <a:extLst>
+              <a:ext uri="{28A0092B-C50C-407E-A947-70E740481C1C}">
+                <a14:useLocalDpi xmlns:a14="http://schemas.microsoft.com/office/drawing/2010/main" val="0"/>
+              </a:ext>
+            </a:extLst>
+          </a:blip>
+          <a:stretch>
+            <a:fillRect/>
+          </a:stretch>
+        </p:blipFill>
         <p:spPr>
           <a:xfrm>
-            <a:off x="519248" y="1447800"/>
-            <a:ext cx="11151916" cy="3692421"/>
+            <a:off x="919510" y="1199408"/>
+            <a:ext cx="10351393" cy="5001324"/>
           </a:xfrm>
+          <a:prstGeom prst="rect">
+            <a:avLst/>
+          </a:prstGeom>
         </p:spPr>
-        <p:txBody>
-          <a:bodyPr/>
-          <a:lstStyle/>
-          <a:p>
-            <a:r>
-              <a:rPr lang="en-US" dirty="0" smtClean="0"/>
-              <a:t>There are zero upfront costs</a:t>
-            </a:r>
-          </a:p>
-          <a:p>
-            <a:r>
-              <a:rPr lang="en-US" dirty="0" smtClean="0"/>
-              <a:t>For virtual machines and web sites, pay by the hour</a:t>
-            </a:r>
-          </a:p>
-          <a:p>
-            <a:r>
-              <a:rPr lang="en-US" dirty="0" smtClean="0"/>
-              <a:t>Scale up and down your solutions as needed</a:t>
-            </a:r>
-          </a:p>
-          <a:p>
-            <a:r>
-              <a:rPr lang="en-US" dirty="0" smtClean="0"/>
-              <a:t>Pay only for services, like Machine Learning, when calculating</a:t>
-            </a:r>
-          </a:p>
-          <a:p>
-            <a:r>
-              <a:rPr lang="en-US" dirty="0" smtClean="0"/>
-              <a:t>Very low storage costs</a:t>
-            </a:r>
-          </a:p>
-          <a:p>
-            <a:endParaRPr lang="en-US" dirty="0"/>
-          </a:p>
-          <a:p>
-            <a:r>
-              <a:rPr lang="en-US" dirty="0" smtClean="0"/>
-              <a:t>Evaluation period is no cost at all – including this training</a:t>
-            </a:r>
-            <a:endParaRPr lang="en-US" dirty="0"/>
-          </a:p>
-        </p:txBody>
-      </p:sp>
+      </p:pic>
     </p:spTree>
     <p:extLst>
       <p:ext uri="{BB962C8B-B14F-4D97-AF65-F5344CB8AC3E}">
-        <p14:creationId xmlns:p14="http://schemas.microsoft.com/office/powerpoint/2010/main" val="1759349385"/>
+        <p14:creationId xmlns:p14="http://schemas.microsoft.com/office/powerpoint/2010/main" val="48239785"/>
       </p:ext>
     </p:extLst>
   </p:cSld>
@@ -19921,49 +19790,9 @@
           </a:p>
         </p:txBody>
       </p:sp>
-      <p:sp>
-        <p:nvSpPr>
-          <p:cNvPr id="3" name="Content Placeholder 2"/>
-          <p:cNvSpPr>
-            <a:spLocks noGrp="1"/>
-          </p:cNvSpPr>
-          <p:nvPr>
-            <p:ph idx="1"/>
-          </p:nvPr>
-        </p:nvSpPr>
-        <p:spPr>
-          <a:xfrm>
-            <a:off x="519248" y="1447800"/>
-            <a:ext cx="11151916" cy="916918"/>
-          </a:xfrm>
-        </p:spPr>
-        <p:txBody>
-          <a:bodyPr/>
-          <a:lstStyle/>
-          <a:p>
-            <a:r>
-              <a:rPr lang="en-US" dirty="0" smtClean="0"/>
-              <a:t>Life begins here: https://</a:t>
-            </a:r>
-            <a:r>
-              <a:rPr lang="en-US" dirty="0" err="1" smtClean="0"/>
-              <a:t>portal.azure.com</a:t>
-            </a:r>
-            <a:endParaRPr lang="en-US" dirty="0" smtClean="0"/>
-          </a:p>
-          <a:p>
-            <a:pPr lvl="1"/>
-            <a:r>
-              <a:rPr lang="en-US" dirty="0" smtClean="0"/>
-              <a:t>Individual pages are called blades</a:t>
-            </a:r>
-            <a:endParaRPr lang="en-US" dirty="0"/>
-          </a:p>
-        </p:txBody>
-      </p:sp>
       <p:pic>
         <p:nvPicPr>
-          <p:cNvPr id="5" name="Picture 4"/>
+          <p:cNvPr id="4" name="Picture 3"/>
           <p:cNvPicPr>
             <a:picLocks noChangeAspect="1"/>
           </p:cNvPicPr>
@@ -19977,14 +19806,65 @@
         </p:blipFill>
         <p:spPr>
           <a:xfrm>
-            <a:off x="4023524" y="2364718"/>
-            <a:ext cx="4143364" cy="3851024"/>
+            <a:off x="2588957" y="2093986"/>
+            <a:ext cx="7012500" cy="3908201"/>
           </a:xfrm>
           <a:prstGeom prst="rect">
             <a:avLst/>
           </a:prstGeom>
         </p:spPr>
       </p:pic>
+      <p:sp>
+        <p:nvSpPr>
+          <p:cNvPr id="6" name="TextBox 5"/>
+          <p:cNvSpPr txBox="1"/>
+          <p:nvPr/>
+        </p:nvSpPr>
+        <p:spPr>
+          <a:xfrm>
+            <a:off x="519248" y="1258244"/>
+            <a:ext cx="11151917" cy="553998"/>
+          </a:xfrm>
+          <a:prstGeom prst="rect">
+            <a:avLst/>
+          </a:prstGeom>
+          <a:noFill/>
+        </p:spPr>
+        <p:txBody>
+          <a:bodyPr wrap="square" lIns="0" tIns="0" rIns="0" bIns="0" rtlCol="0">
+            <a:spAutoFit/>
+          </a:bodyPr>
+          <a:lstStyle/>
+          <a:p>
+            <a:pPr>
+              <a:lnSpc>
+                <a:spcPct val="90000"/>
+              </a:lnSpc>
+              <a:spcBef>
+                <a:spcPct val="20000"/>
+              </a:spcBef>
+              <a:buSzPct val="80000"/>
+            </a:pPr>
+            <a:r>
+              <a:rPr lang="en-US" sz="4000" dirty="0" smtClean="0">
+                <a:solidFill>
+                  <a:schemeClr val="accent2"/>
+                </a:solidFill>
+                <a:latin typeface="Segoe UI Light" panose="020B0502040204020203" pitchFamily="34" charset="0"/>
+                <a:cs typeface="Segoe UI Light" panose="020B0502040204020203" pitchFamily="34" charset="0"/>
+              </a:rPr>
+              <a:t>Life begins at https://portal.azure.com</a:t>
+            </a:r>
+            <a:endParaRPr lang="en-US" sz="4000" dirty="0">
+              <a:solidFill>
+                <a:schemeClr val="accent2"/>
+              </a:solidFill>
+              <a:latin typeface="Segoe UI Light" panose="020B0502040204020203" pitchFamily="34" charset="0"/>
+              <a:cs typeface="Segoe UI Light" panose="020B0502040204020203" pitchFamily="34" charset="0"/>
+            </a:endParaRPr>
+          </a:p>
+        </p:txBody>
+      </p:sp>
     </p:spTree>
     <p:extLst>
       <p:ext uri="{BB962C8B-B14F-4D97-AF65-F5344CB8AC3E}">
@@ -20009,323 +19889,6 @@
 </file>
 
 <file path=ppt/slides/slide16.xml><?xml version="1.0" encoding="utf-8"?>
-<p:sld xmlns:a="http://schemas.openxmlformats.org/drawingml/2006/main" xmlns:r="http://schemas.openxmlformats.org/officeDocument/2006/relationships" xmlns:p="http://schemas.openxmlformats.org/presentationml/2006/main">
-  <p:cSld>
-    <p:spTree>
-      <p:nvGrpSpPr>
-        <p:cNvPr id="1" name=""/>
-        <p:cNvGrpSpPr/>
-        <p:nvPr/>
-      </p:nvGrpSpPr>
-      <p:grpSpPr>
-        <a:xfrm>
-          <a:off x="0" y="0"/>
-          <a:ext cx="0" cy="0"/>
-          <a:chOff x="0" y="0"/>
-          <a:chExt cx="0" cy="0"/>
-        </a:xfrm>
-      </p:grpSpPr>
-      <p:sp>
-        <p:nvSpPr>
-          <p:cNvPr id="2" name="Title 1"/>
-          <p:cNvSpPr>
-            <a:spLocks noGrp="1"/>
-          </p:cNvSpPr>
-          <p:nvPr>
-            <p:ph type="title"/>
-          </p:nvPr>
-        </p:nvSpPr>
-        <p:spPr/>
-        <p:txBody>
-          <a:bodyPr/>
-          <a:lstStyle/>
-          <a:p>
-            <a:r>
-              <a:rPr lang="en-US" dirty="0" smtClean="0"/>
-              <a:t>Virtual Machines</a:t>
-            </a:r>
-            <a:endParaRPr lang="en-US" dirty="0"/>
-          </a:p>
-        </p:txBody>
-      </p:sp>
-      <p:sp>
-        <p:nvSpPr>
-          <p:cNvPr id="3" name="Content Placeholder 2"/>
-          <p:cNvSpPr>
-            <a:spLocks noGrp="1"/>
-          </p:cNvSpPr>
-          <p:nvPr>
-            <p:ph idx="1"/>
-          </p:nvPr>
-        </p:nvSpPr>
-        <p:spPr>
-          <a:xfrm>
-            <a:off x="519248" y="1447800"/>
-            <a:ext cx="11151916" cy="4166269"/>
-          </a:xfrm>
-        </p:spPr>
-        <p:txBody>
-          <a:bodyPr/>
-          <a:lstStyle/>
-          <a:p>
-            <a:r>
-              <a:rPr lang="en-US" dirty="0" smtClean="0"/>
-              <a:t>Linux and Windows Server both supported</a:t>
-            </a:r>
-          </a:p>
-          <a:p>
-            <a:r>
-              <a:rPr lang="en-US" dirty="0" smtClean="0"/>
-              <a:t>Can use remote desktop or SSH and run any workload</a:t>
-            </a:r>
-          </a:p>
-          <a:p>
-            <a:r>
-              <a:rPr lang="en-US" dirty="0" smtClean="0"/>
-              <a:t>You are the admin on the virtual machine</a:t>
-            </a:r>
-          </a:p>
-          <a:p>
-            <a:r>
-              <a:rPr lang="en-US" dirty="0" smtClean="0"/>
-              <a:t>Very durable</a:t>
-            </a:r>
-          </a:p>
-          <a:p>
-            <a:pPr lvl="1"/>
-            <a:r>
-              <a:rPr lang="en-US" dirty="0" smtClean="0"/>
-              <a:t>If you reboot, all changes and data </a:t>
-            </a:r>
-            <a:r>
-              <a:rPr lang="en-US" smtClean="0"/>
-              <a:t>stored </a:t>
-            </a:r>
-            <a:r>
-              <a:rPr lang="en-US" smtClean="0"/>
-              <a:t>on </a:t>
-            </a:r>
-            <a:r>
-              <a:rPr lang="en-US" dirty="0" smtClean="0"/>
-              <a:t>disk</a:t>
-            </a:r>
-          </a:p>
-          <a:p>
-            <a:r>
-              <a:rPr lang="en-US" dirty="0" smtClean="0"/>
-              <a:t>Virtual private networking </a:t>
-            </a:r>
-          </a:p>
-          <a:p>
-            <a:pPr lvl="1"/>
-            <a:r>
-              <a:rPr lang="en-US" dirty="0" smtClean="0"/>
-              <a:t>VMs can be grouped as part of a private network</a:t>
-            </a:r>
-          </a:p>
-          <a:p>
-            <a:endParaRPr lang="en-US" dirty="0"/>
-          </a:p>
-        </p:txBody>
-      </p:sp>
-      <p:pic>
-        <p:nvPicPr>
-          <p:cNvPr id="5" name="Picture 4"/>
-          <p:cNvPicPr>
-            <a:picLocks noChangeAspect="1"/>
-          </p:cNvPicPr>
-          <p:nvPr/>
-        </p:nvPicPr>
-        <p:blipFill>
-          <a:blip r:embed="rId3" cstate="print">
-            <a:extLst>
-              <a:ext uri="{28A0092B-C50C-407E-A947-70E740481C1C}">
-                <a14:useLocalDpi xmlns:a14="http://schemas.microsoft.com/office/drawing/2010/main" val="0"/>
-              </a:ext>
-            </a:extLst>
-          </a:blip>
-          <a:stretch>
-            <a:fillRect/>
-          </a:stretch>
-        </p:blipFill>
-        <p:spPr>
-          <a:xfrm>
-            <a:off x="10110588" y="4726499"/>
-            <a:ext cx="1560576" cy="1560576"/>
-          </a:xfrm>
-          <a:prstGeom prst="rect">
-            <a:avLst/>
-          </a:prstGeom>
-        </p:spPr>
-      </p:pic>
-    </p:spTree>
-    <p:extLst>
-      <p:ext uri="{BB962C8B-B14F-4D97-AF65-F5344CB8AC3E}">
-        <p14:creationId xmlns:p14="http://schemas.microsoft.com/office/powerpoint/2010/main" val="1474276215"/>
-      </p:ext>
-    </p:extLst>
-  </p:cSld>
-  <p:clrMapOvr>
-    <a:masterClrMapping/>
-  </p:clrMapOvr>
-  <p:transition>
-    <p:fade/>
-  </p:transition>
-  <p:timing>
-    <p:tnLst>
-      <p:par>
-        <p:cTn id="1" dur="indefinite" restart="never" nodeType="tmRoot"/>
-      </p:par>
-    </p:tnLst>
-  </p:timing>
-</p:sld>
-</file>
-
-<file path=ppt/slides/slide17.xml><?xml version="1.0" encoding="utf-8"?>
-<p:sld xmlns:a="http://schemas.openxmlformats.org/drawingml/2006/main" xmlns:r="http://schemas.openxmlformats.org/officeDocument/2006/relationships" xmlns:p="http://schemas.openxmlformats.org/presentationml/2006/main">
-  <p:cSld>
-    <p:spTree>
-      <p:nvGrpSpPr>
-        <p:cNvPr id="1" name=""/>
-        <p:cNvGrpSpPr/>
-        <p:nvPr/>
-      </p:nvGrpSpPr>
-      <p:grpSpPr>
-        <a:xfrm>
-          <a:off x="0" y="0"/>
-          <a:ext cx="0" cy="0"/>
-          <a:chOff x="0" y="0"/>
-          <a:chExt cx="0" cy="0"/>
-        </a:xfrm>
-      </p:grpSpPr>
-      <p:sp>
-        <p:nvSpPr>
-          <p:cNvPr id="2" name="Title 1"/>
-          <p:cNvSpPr>
-            <a:spLocks noGrp="1"/>
-          </p:cNvSpPr>
-          <p:nvPr>
-            <p:ph type="title"/>
-          </p:nvPr>
-        </p:nvSpPr>
-        <p:spPr/>
-        <p:txBody>
-          <a:bodyPr/>
-          <a:lstStyle/>
-          <a:p>
-            <a:r>
-              <a:rPr lang="en-US" dirty="0" smtClean="0"/>
-              <a:t>Microsoft Azure Services</a:t>
-            </a:r>
-            <a:endParaRPr lang="en-US" dirty="0"/>
-          </a:p>
-        </p:txBody>
-      </p:sp>
-      <p:sp>
-        <p:nvSpPr>
-          <p:cNvPr id="3" name="Content Placeholder 2"/>
-          <p:cNvSpPr>
-            <a:spLocks noGrp="1"/>
-          </p:cNvSpPr>
-          <p:nvPr>
-            <p:ph idx="1"/>
-          </p:nvPr>
-        </p:nvSpPr>
-        <p:spPr>
-          <a:xfrm>
-            <a:off x="519248" y="1447800"/>
-            <a:ext cx="11151916" cy="4301562"/>
-          </a:xfrm>
-        </p:spPr>
-        <p:txBody>
-          <a:bodyPr/>
-          <a:lstStyle/>
-          <a:p>
-            <a:r>
-              <a:rPr lang="en-US" dirty="0" smtClean="0"/>
-              <a:t>The parts of Azure you care about as </a:t>
-            </a:r>
-            <a:r>
-              <a:rPr lang="en-US" smtClean="0"/>
-              <a:t>a researcher!</a:t>
-            </a:r>
-            <a:endParaRPr lang="en-US" dirty="0" smtClean="0"/>
-          </a:p>
-          <a:p>
-            <a:pPr lvl="1"/>
-            <a:r>
-              <a:rPr lang="en-US" dirty="0" smtClean="0"/>
-              <a:t>Storage</a:t>
-            </a:r>
-          </a:p>
-          <a:p>
-            <a:pPr lvl="1"/>
-            <a:r>
-              <a:rPr lang="en-US" dirty="0" smtClean="0"/>
-              <a:t>Machine Learning</a:t>
-            </a:r>
-          </a:p>
-          <a:p>
-            <a:pPr lvl="1"/>
-            <a:r>
-              <a:rPr lang="en-US" dirty="0" smtClean="0"/>
-              <a:t>Stream Analytics</a:t>
-            </a:r>
-          </a:p>
-          <a:p>
-            <a:pPr lvl="1"/>
-            <a:r>
-              <a:rPr lang="en-US" dirty="0" smtClean="0"/>
-              <a:t>HDInsight (Hadoop, Spark)</a:t>
-            </a:r>
-          </a:p>
-          <a:p>
-            <a:pPr lvl="1"/>
-            <a:r>
-              <a:rPr lang="en-US" dirty="0" smtClean="0"/>
-              <a:t>High Performance Computing</a:t>
-            </a:r>
-          </a:p>
-          <a:p>
-            <a:pPr lvl="1"/>
-            <a:endParaRPr lang="en-US" dirty="0"/>
-          </a:p>
-          <a:p>
-            <a:r>
-              <a:rPr lang="en-US" dirty="0" smtClean="0"/>
-              <a:t>Each of these have upcoming hands-on labs</a:t>
-            </a:r>
-          </a:p>
-          <a:p>
-            <a:pPr lvl="1"/>
-            <a:endParaRPr lang="en-US" dirty="0"/>
-          </a:p>
-        </p:txBody>
-      </p:sp>
-    </p:spTree>
-    <p:extLst>
-      <p:ext uri="{BB962C8B-B14F-4D97-AF65-F5344CB8AC3E}">
-        <p14:creationId xmlns:p14="http://schemas.microsoft.com/office/powerpoint/2010/main" val="1923612932"/>
-      </p:ext>
-    </p:extLst>
-  </p:cSld>
-  <p:clrMapOvr>
-    <a:masterClrMapping/>
-  </p:clrMapOvr>
-  <p:transition>
-    <p:fade/>
-  </p:transition>
-  <p:timing>
-    <p:tnLst>
-      <p:par>
-        <p:cTn id="1" dur="indefinite" restart="never" nodeType="tmRoot"/>
-      </p:par>
-    </p:tnLst>
-  </p:timing>
-</p:sld>
-</file>
-
-<file path=ppt/slides/slide18.xml><?xml version="1.0" encoding="utf-8"?>
 <p:sld xmlns:a="http://schemas.openxmlformats.org/drawingml/2006/main" xmlns:r="http://schemas.openxmlformats.org/officeDocument/2006/relationships" xmlns:p="http://schemas.openxmlformats.org/presentationml/2006/main">
   <p:cSld>
     <p:spTree>
@@ -20438,7 +20001,7 @@
 </p:sld>
 </file>
 
-<file path=ppt/slides/slide19.xml><?xml version="1.0" encoding="utf-8"?>
+<file path=ppt/slides/slide17.xml><?xml version="1.0" encoding="utf-8"?>
 <p:sld xmlns:a="http://schemas.openxmlformats.org/drawingml/2006/main" xmlns:r="http://schemas.openxmlformats.org/officeDocument/2006/relationships" xmlns:p="http://schemas.openxmlformats.org/presentationml/2006/main">
   <p:cSld>
     <p:spTree>
@@ -20533,8 +20096,13 @@
           <a:p>
             <a:r>
               <a:rPr lang="en-US" dirty="0" smtClean="0"/>
-              <a:t>Key learning objects for this section</a:t>
+              <a:t>Key learning </a:t>
             </a:r>
+            <a:r>
+              <a:rPr lang="en-US" dirty="0" smtClean="0"/>
+              <a:t>objectives</a:t>
+            </a:r>
+            <a:endParaRPr lang="en-US" dirty="0" smtClean="0"/>
           </a:p>
           <a:p>
             <a:pPr lvl="1"/>
@@ -20649,7 +20217,15 @@
           <a:p>
             <a:r>
               <a:rPr lang="en-US" dirty="0" smtClean="0"/>
-              <a:t>What is the cloud?</a:t>
+              <a:t>What is the </a:t>
+            </a:r>
+            <a:r>
+              <a:rPr lang="en-US" dirty="0" smtClean="0"/>
+              <a:t>Cloud</a:t>
+            </a:r>
+            <a:r>
+              <a:rPr lang="en-US" dirty="0" smtClean="0"/>
+              <a:t>?</a:t>
             </a:r>
             <a:endParaRPr lang="en-US" dirty="0"/>
           </a:p>
@@ -28615,7 +28191,7 @@
         <p:spPr>
           <a:xfrm>
             <a:off x="519248" y="1447800"/>
-            <a:ext cx="11151916" cy="4436984"/>
+            <a:ext cx="11151916" cy="4880054"/>
           </a:xfrm>
         </p:spPr>
         <p:txBody>
@@ -28665,8 +28241,13 @@
           <a:p>
             <a:r>
               <a:rPr lang="en-US" dirty="0" smtClean="0"/>
-              <a:t>Built entirely on Azure Machine Language</a:t>
+              <a:t>Built entirely on Azure Machine </a:t>
             </a:r>
+            <a:r>
+              <a:rPr lang="en-US" dirty="0" smtClean="0"/>
+              <a:t>Learning</a:t>
+            </a:r>
+            <a:endParaRPr lang="en-US" dirty="0" smtClean="0"/>
           </a:p>
           <a:p>
             <a:pPr lvl="1"/>
@@ -28777,7 +28358,23 @@
           <a:p>
             <a:r>
               <a:rPr lang="en-US" dirty="0" smtClean="0"/>
-              <a:t>100% cross platform with massive open source support</a:t>
+              <a:t>100% </a:t>
+            </a:r>
+            <a:r>
+              <a:rPr lang="en-US" dirty="0" smtClean="0"/>
+              <a:t>cross-platform </a:t>
+            </a:r>
+            <a:r>
+              <a:rPr lang="en-US" dirty="0" smtClean="0"/>
+              <a:t>with massive </a:t>
+            </a:r>
+            <a:r>
+              <a:rPr lang="en-US" dirty="0" smtClean="0"/>
+              <a:t>open-source </a:t>
+            </a:r>
+            <a:r>
+              <a:rPr lang="en-US" dirty="0" smtClean="0"/>
+              <a:t>support</a:t>
             </a:r>
           </a:p>
         </p:txBody>

</xml_diff>

<commit_message>
Updates to introduction slides
Closes #113
</commit_message>
<xml_diff>
--- a/Content/Introduction/Azure Overview.pptx
+++ b/Content/Introduction/Azure Overview.pptx
@@ -5,7 +5,7 @@
     <p:sldMasterId id="2147483680" r:id="rId1"/>
   </p:sldMasterIdLst>
   <p:notesMasterIdLst>
-    <p:notesMasterId r:id="rId19"/>
+    <p:notesMasterId r:id="rId18"/>
   </p:notesMasterIdLst>
   <p:sldIdLst>
     <p:sldId id="256" r:id="rId2"/>
@@ -20,11 +20,10 @@
     <p:sldId id="264" r:id="rId11"/>
     <p:sldId id="266" r:id="rId12"/>
     <p:sldId id="281" r:id="rId13"/>
-    <p:sldId id="268" r:id="rId14"/>
-    <p:sldId id="282" r:id="rId15"/>
-    <p:sldId id="269" r:id="rId16"/>
-    <p:sldId id="275" r:id="rId17"/>
-    <p:sldId id="276" r:id="rId18"/>
+    <p:sldId id="282" r:id="rId14"/>
+    <p:sldId id="269" r:id="rId15"/>
+    <p:sldId id="275" r:id="rId16"/>
+    <p:sldId id="276" r:id="rId17"/>
   </p:sldIdLst>
   <p:sldSz cx="12192000" cy="6858000"/>
   <p:notesSz cx="6858000" cy="9144000"/>
@@ -144,7 +143,6 @@
             <p14:sldId id="264"/>
             <p14:sldId id="266"/>
             <p14:sldId id="281"/>
-            <p14:sldId id="268"/>
             <p14:sldId id="282"/>
             <p14:sldId id="269"/>
             <p14:sldId id="275"/>
@@ -242,7 +240,7 @@
           <a:p>
             <a:fld id="{2E5CA586-3557-4985-BCD4-35EF5AC8B4A4}" type="datetimeFigureOut">
               <a:rPr lang="en-US" smtClean="0"/>
-              <a:t>10/7/2015</a:t>
+              <a:t>10/8/15</a:t>
             </a:fld>
             <a:endParaRPr lang="en-US"/>
           </a:p>
@@ -791,6 +789,116 @@
           <a:bodyPr/>
           <a:lstStyle/>
           <a:p>
+            <a:r>
+              <a:rPr lang="en-US" dirty="0" smtClean="0"/>
+              <a:t>Monitoring is huge because NOAA weather service only does 700 locations nationally.</a:t>
+            </a:r>
+          </a:p>
+          <a:p>
+            <a:r>
+              <a:rPr lang="en-US" dirty="0" smtClean="0"/>
+              <a:t>Additionally,</a:t>
+            </a:r>
+            <a:r>
+              <a:rPr lang="en-US" baseline="0" dirty="0" smtClean="0"/>
+              <a:t> this project went to Azure because of enhanced collaboration. All researchers across the US could access the virtual machines instead of being held by a single university.</a:t>
+            </a:r>
+            <a:r>
+              <a:rPr lang="en-US" dirty="0" smtClean="0"/>
+              <a:t> </a:t>
+            </a:r>
+            <a:endParaRPr lang="en-US" dirty="0"/>
+          </a:p>
+        </p:txBody>
+      </p:sp>
+      <p:sp>
+        <p:nvSpPr>
+          <p:cNvPr id="4" name="Slide Number Placeholder 3"/>
+          <p:cNvSpPr>
+            <a:spLocks noGrp="1"/>
+          </p:cNvSpPr>
+          <p:nvPr>
+            <p:ph type="sldNum" sz="quarter" idx="10"/>
+          </p:nvPr>
+        </p:nvSpPr>
+        <p:spPr/>
+        <p:txBody>
+          <a:bodyPr/>
+          <a:lstStyle/>
+          <a:p>
+            <a:fld id="{BC60BE34-BC89-4C98-A56B-79B7A098D024}" type="slidenum">
+              <a:rPr lang="en-US" smtClean="0"/>
+              <a:t>6</a:t>
+            </a:fld>
+            <a:endParaRPr lang="en-US"/>
+          </a:p>
+        </p:txBody>
+      </p:sp>
+    </p:spTree>
+    <p:extLst>
+      <p:ext uri="{BB962C8B-B14F-4D97-AF65-F5344CB8AC3E}">
+        <p14:creationId xmlns:p14="http://schemas.microsoft.com/office/powerpoint/2010/main" val="2089112795"/>
+      </p:ext>
+    </p:extLst>
+  </p:cSld>
+  <p:clrMapOvr>
+    <a:masterClrMapping/>
+  </p:clrMapOvr>
+</p:notes>
+</file>
+
+<file path=ppt/notesSlides/notesSlide4.xml><?xml version="1.0" encoding="utf-8"?>
+<p:notes xmlns:a="http://schemas.openxmlformats.org/drawingml/2006/main" xmlns:r="http://schemas.openxmlformats.org/officeDocument/2006/relationships" xmlns:p="http://schemas.openxmlformats.org/presentationml/2006/main">
+  <p:cSld>
+    <p:spTree>
+      <p:nvGrpSpPr>
+        <p:cNvPr id="1" name=""/>
+        <p:cNvGrpSpPr/>
+        <p:nvPr/>
+      </p:nvGrpSpPr>
+      <p:grpSpPr>
+        <a:xfrm>
+          <a:off x="0" y="0"/>
+          <a:ext cx="0" cy="0"/>
+          <a:chOff x="0" y="0"/>
+          <a:chExt cx="0" cy="0"/>
+        </a:xfrm>
+      </p:grpSpPr>
+      <p:sp>
+        <p:nvSpPr>
+          <p:cNvPr id="2" name="Slide Image Placeholder 1"/>
+          <p:cNvSpPr>
+            <a:spLocks noGrp="1" noRot="1" noChangeAspect="1"/>
+          </p:cNvSpPr>
+          <p:nvPr>
+            <p:ph type="sldImg"/>
+          </p:nvPr>
+        </p:nvSpPr>
+        <p:spPr/>
+      </p:sp>
+      <p:sp>
+        <p:nvSpPr>
+          <p:cNvPr id="3" name="Notes Placeholder 2"/>
+          <p:cNvSpPr>
+            <a:spLocks noGrp="1"/>
+          </p:cNvSpPr>
+          <p:nvPr>
+            <p:ph type="body" idx="1"/>
+          </p:nvPr>
+        </p:nvSpPr>
+        <p:spPr/>
+        <p:txBody>
+          <a:bodyPr/>
+          <a:lstStyle/>
+          <a:p>
+            <a:r>
+              <a:rPr lang="en-US" dirty="0" smtClean="0"/>
+              <a:t>The web</a:t>
+            </a:r>
+            <a:r>
+              <a:rPr lang="en-US" baseline="0" dirty="0" smtClean="0"/>
+              <a:t> service is released into the Azure Market place so others can benefit. A real example of SaaS!</a:t>
+            </a:r>
             <a:endParaRPr lang="en-US" dirty="0"/>
           </a:p>
         </p:txBody>
@@ -831,7 +939,7 @@
 </p:notes>
 </file>
 
-<file path=ppt/notesSlides/notesSlide4.xml><?xml version="1.0" encoding="utf-8"?>
+<file path=ppt/notesSlides/notesSlide5.xml><?xml version="1.0" encoding="utf-8"?>
 <p:notes xmlns:a="http://schemas.openxmlformats.org/drawingml/2006/main" xmlns:r="http://schemas.openxmlformats.org/officeDocument/2006/relationships" xmlns:p="http://schemas.openxmlformats.org/presentationml/2006/main">
   <p:cSld>
     <p:spTree>
@@ -928,7 +1036,7 @@
 </p:notes>
 </file>
 
-<file path=ppt/notesSlides/notesSlide5.xml><?xml version="1.0" encoding="utf-8"?>
+<file path=ppt/notesSlides/notesSlide6.xml><?xml version="1.0" encoding="utf-8"?>
 <p:notes xmlns:a="http://schemas.openxmlformats.org/drawingml/2006/main" xmlns:r="http://schemas.openxmlformats.org/officeDocument/2006/relationships" xmlns:p="http://schemas.openxmlformats.org/presentationml/2006/main">
   <p:cSld>
     <p:spTree>
@@ -1012,7 +1120,7 @@
 </p:notes>
 </file>
 
-<file path=ppt/notesSlides/notesSlide6.xml><?xml version="1.0" encoding="utf-8"?>
+<file path=ppt/notesSlides/notesSlide7.xml><?xml version="1.0" encoding="utf-8"?>
 <p:notes xmlns:a="http://schemas.openxmlformats.org/drawingml/2006/main" xmlns:r="http://schemas.openxmlformats.org/officeDocument/2006/relationships" xmlns:p="http://schemas.openxmlformats.org/presentationml/2006/main">
   <p:cSld>
     <p:spTree>
@@ -1096,7 +1204,7 @@
 </p:notes>
 </file>
 
-<file path=ppt/notesSlides/notesSlide7.xml><?xml version="1.0" encoding="utf-8"?>
+<file path=ppt/notesSlides/notesSlide8.xml><?xml version="1.0" encoding="utf-8"?>
 <p:notes xmlns:a="http://schemas.openxmlformats.org/drawingml/2006/main" xmlns:r="http://schemas.openxmlformats.org/officeDocument/2006/relationships" xmlns:p="http://schemas.openxmlformats.org/presentationml/2006/main">
   <p:cSld>
     <p:spTree>
@@ -1162,90 +1270,6 @@
             <a:fld id="{BC60BE34-BC89-4C98-A56B-79B7A098D024}" type="slidenum">
               <a:rPr lang="en-US" smtClean="0"/>
               <a:t>13</a:t>
-            </a:fld>
-            <a:endParaRPr lang="en-US"/>
-          </a:p>
-        </p:txBody>
-      </p:sp>
-    </p:spTree>
-    <p:extLst>
-      <p:ext uri="{BB962C8B-B14F-4D97-AF65-F5344CB8AC3E}">
-        <p14:creationId xmlns:p14="http://schemas.microsoft.com/office/powerpoint/2010/main" val="2028363055"/>
-      </p:ext>
-    </p:extLst>
-  </p:cSld>
-  <p:clrMapOvr>
-    <a:masterClrMapping/>
-  </p:clrMapOvr>
-</p:notes>
-</file>
-
-<file path=ppt/notesSlides/notesSlide8.xml><?xml version="1.0" encoding="utf-8"?>
-<p:notes xmlns:a="http://schemas.openxmlformats.org/drawingml/2006/main" xmlns:r="http://schemas.openxmlformats.org/officeDocument/2006/relationships" xmlns:p="http://schemas.openxmlformats.org/presentationml/2006/main">
-  <p:cSld>
-    <p:spTree>
-      <p:nvGrpSpPr>
-        <p:cNvPr id="1" name=""/>
-        <p:cNvGrpSpPr/>
-        <p:nvPr/>
-      </p:nvGrpSpPr>
-      <p:grpSpPr>
-        <a:xfrm>
-          <a:off x="0" y="0"/>
-          <a:ext cx="0" cy="0"/>
-          <a:chOff x="0" y="0"/>
-          <a:chExt cx="0" cy="0"/>
-        </a:xfrm>
-      </p:grpSpPr>
-      <p:sp>
-        <p:nvSpPr>
-          <p:cNvPr id="2" name="Slide Image Placeholder 1"/>
-          <p:cNvSpPr>
-            <a:spLocks noGrp="1" noRot="1" noChangeAspect="1"/>
-          </p:cNvSpPr>
-          <p:nvPr>
-            <p:ph type="sldImg"/>
-          </p:nvPr>
-        </p:nvSpPr>
-        <p:spPr/>
-      </p:sp>
-      <p:sp>
-        <p:nvSpPr>
-          <p:cNvPr id="3" name="Notes Placeholder 2"/>
-          <p:cNvSpPr>
-            <a:spLocks noGrp="1"/>
-          </p:cNvSpPr>
-          <p:nvPr>
-            <p:ph type="body" idx="1"/>
-          </p:nvPr>
-        </p:nvSpPr>
-        <p:spPr/>
-        <p:txBody>
-          <a:bodyPr/>
-          <a:lstStyle/>
-          <a:p>
-            <a:endParaRPr lang="en-US" dirty="0"/>
-          </a:p>
-        </p:txBody>
-      </p:sp>
-      <p:sp>
-        <p:nvSpPr>
-          <p:cNvPr id="4" name="Slide Number Placeholder 3"/>
-          <p:cNvSpPr>
-            <a:spLocks noGrp="1"/>
-          </p:cNvSpPr>
-          <p:nvPr>
-            <p:ph type="sldNum" sz="quarter" idx="10"/>
-          </p:nvPr>
-        </p:nvSpPr>
-        <p:spPr/>
-        <p:txBody>
-          <a:bodyPr/>
-          <a:lstStyle/>
-          <a:p>
-            <a:fld id="{BC60BE34-BC89-4C98-A56B-79B7A098D024}" type="slidenum">
-              <a:rPr lang="en-US" smtClean="0"/>
-              <a:t>14</a:t>
             </a:fld>
             <a:endParaRPr lang="en-US"/>
           </a:p>
@@ -19364,333 +19388,6 @@
           <a:p>
             <a:r>
               <a:rPr lang="en-US" dirty="0" smtClean="0"/>
-              <a:t>Microsoft Azure Services (Partial List)</a:t>
-            </a:r>
-            <a:endParaRPr lang="en-US" dirty="0"/>
-          </a:p>
-        </p:txBody>
-      </p:sp>
-      <p:sp>
-        <p:nvSpPr>
-          <p:cNvPr id="3" name="Content Placeholder 2"/>
-          <p:cNvSpPr>
-            <a:spLocks noGrp="1"/>
-          </p:cNvSpPr>
-          <p:nvPr>
-            <p:ph sz="half" idx="1"/>
-          </p:nvPr>
-        </p:nvSpPr>
-        <p:spPr>
-          <a:xfrm>
-            <a:off x="519248" y="1447800"/>
-            <a:ext cx="5487829" cy="4869025"/>
-          </a:xfrm>
-        </p:spPr>
-        <p:txBody>
-          <a:bodyPr/>
-          <a:lstStyle/>
-          <a:p>
-            <a:r>
-              <a:rPr lang="en-US" sz="2400" dirty="0" smtClean="0"/>
-              <a:t>Compute</a:t>
-            </a:r>
-          </a:p>
-          <a:p>
-            <a:pPr lvl="1"/>
-            <a:r>
-              <a:rPr lang="en-US" sz="2000" dirty="0" smtClean="0">
-                <a:solidFill>
-                  <a:schemeClr val="accent2"/>
-                </a:solidFill>
-              </a:rPr>
-              <a:t>Virtual Machines</a:t>
-            </a:r>
-          </a:p>
-          <a:p>
-            <a:pPr lvl="1"/>
-            <a:r>
-              <a:rPr lang="en-US" sz="2000" dirty="0" smtClean="0"/>
-              <a:t>Cloud Services</a:t>
-            </a:r>
-          </a:p>
-          <a:p>
-            <a:pPr lvl="1"/>
-            <a:r>
-              <a:rPr lang="en-US" sz="2000" dirty="0" smtClean="0"/>
-              <a:t>Batch</a:t>
-            </a:r>
-          </a:p>
-          <a:p>
-            <a:r>
-              <a:rPr lang="en-US" sz="2400" dirty="0" smtClean="0"/>
-              <a:t>Web &amp; Mobile</a:t>
-            </a:r>
-          </a:p>
-          <a:p>
-            <a:pPr lvl="1"/>
-            <a:r>
-              <a:rPr lang="en-US" sz="2000" dirty="0" smtClean="0"/>
-              <a:t>Web Apps</a:t>
-            </a:r>
-          </a:p>
-          <a:p>
-            <a:pPr lvl="1"/>
-            <a:r>
-              <a:rPr lang="en-US" sz="2000" dirty="0" smtClean="0"/>
-              <a:t>Notification Hubs</a:t>
-            </a:r>
-          </a:p>
-          <a:p>
-            <a:r>
-              <a:rPr lang="en-US" sz="2400" dirty="0" smtClean="0"/>
-              <a:t>Data &amp; Storage</a:t>
-            </a:r>
-          </a:p>
-          <a:p>
-            <a:pPr lvl="1"/>
-            <a:r>
-              <a:rPr lang="en-US" sz="2000" dirty="0" err="1" smtClean="0"/>
-              <a:t>DocumentDB</a:t>
-            </a:r>
-            <a:endParaRPr lang="en-US" sz="2000" dirty="0" smtClean="0"/>
-          </a:p>
-          <a:p>
-            <a:pPr lvl="1"/>
-            <a:r>
-              <a:rPr lang="en-US" sz="2000" dirty="0" err="1" smtClean="0"/>
-              <a:t>Redis</a:t>
-            </a:r>
-            <a:r>
-              <a:rPr lang="en-US" sz="2000" dirty="0" smtClean="0"/>
-              <a:t> Cache</a:t>
-            </a:r>
-          </a:p>
-          <a:p>
-            <a:pPr lvl="1"/>
-            <a:r>
-              <a:rPr lang="en-US" sz="2000" dirty="0" smtClean="0"/>
-              <a:t>SQL Database</a:t>
-            </a:r>
-          </a:p>
-          <a:p>
-            <a:pPr lvl="1"/>
-            <a:r>
-              <a:rPr lang="en-US" sz="2000" dirty="0" smtClean="0">
-                <a:solidFill>
-                  <a:schemeClr val="accent2"/>
-                </a:solidFill>
-              </a:rPr>
-              <a:t>Blob storage</a:t>
-            </a:r>
-          </a:p>
-          <a:p>
-            <a:pPr lvl="1"/>
-            <a:r>
-              <a:rPr lang="en-US" sz="2000" dirty="0" smtClean="0"/>
-              <a:t>Azure Search</a:t>
-            </a:r>
-          </a:p>
-          <a:p>
-            <a:pPr lvl="1"/>
-            <a:endParaRPr lang="en-US" sz="2000" dirty="0"/>
-          </a:p>
-        </p:txBody>
-      </p:sp>
-      <p:sp>
-        <p:nvSpPr>
-          <p:cNvPr id="4" name="Content Placeholder 3"/>
-          <p:cNvSpPr>
-            <a:spLocks noGrp="1"/>
-          </p:cNvSpPr>
-          <p:nvPr>
-            <p:ph sz="half" idx="2"/>
-          </p:nvPr>
-        </p:nvSpPr>
-        <p:spPr>
-          <a:xfrm>
-            <a:off x="6183335" y="1447800"/>
-            <a:ext cx="5487829" cy="4733604"/>
-          </a:xfrm>
-        </p:spPr>
-        <p:txBody>
-          <a:bodyPr/>
-          <a:lstStyle/>
-          <a:p>
-            <a:r>
-              <a:rPr lang="en-US" sz="2400" dirty="0" smtClean="0"/>
-              <a:t>Analytics</a:t>
-            </a:r>
-          </a:p>
-          <a:p>
-            <a:pPr lvl="1"/>
-            <a:r>
-              <a:rPr lang="en-US" sz="2000" dirty="0" smtClean="0">
-                <a:solidFill>
-                  <a:schemeClr val="accent2"/>
-                </a:solidFill>
-              </a:rPr>
-              <a:t>HDInsight</a:t>
-            </a:r>
-          </a:p>
-          <a:p>
-            <a:pPr lvl="1"/>
-            <a:r>
-              <a:rPr lang="en-US" sz="2000" dirty="0" smtClean="0">
-                <a:solidFill>
-                  <a:schemeClr val="accent2"/>
-                </a:solidFill>
-              </a:rPr>
-              <a:t>Machine Learning</a:t>
-            </a:r>
-          </a:p>
-          <a:p>
-            <a:pPr lvl="1"/>
-            <a:r>
-              <a:rPr lang="en-US" sz="2000" dirty="0" smtClean="0">
-                <a:solidFill>
-                  <a:schemeClr val="accent2"/>
-                </a:solidFill>
-              </a:rPr>
-              <a:t>Stream Analytics</a:t>
-            </a:r>
-          </a:p>
-          <a:p>
-            <a:pPr lvl="1"/>
-            <a:r>
-              <a:rPr lang="en-US" sz="2000" dirty="0" smtClean="0">
-                <a:solidFill>
-                  <a:schemeClr val="accent2"/>
-                </a:solidFill>
-              </a:rPr>
-              <a:t>Event </a:t>
-            </a:r>
-            <a:r>
-              <a:rPr lang="en-US" sz="2000" dirty="0" smtClean="0">
-                <a:solidFill>
-                  <a:schemeClr val="accent2"/>
-                </a:solidFill>
-              </a:rPr>
-              <a:t>Hubs</a:t>
-            </a:r>
-            <a:endParaRPr lang="en-US" sz="2000" dirty="0" smtClean="0">
-              <a:solidFill>
-                <a:schemeClr val="accent2"/>
-              </a:solidFill>
-            </a:endParaRPr>
-          </a:p>
-          <a:p>
-            <a:r>
-              <a:rPr lang="en-US" sz="2400" dirty="0" smtClean="0"/>
-              <a:t>Networking</a:t>
-            </a:r>
-          </a:p>
-          <a:p>
-            <a:pPr lvl="1"/>
-            <a:r>
-              <a:rPr lang="en-US" sz="2000" dirty="0" smtClean="0"/>
-              <a:t>VPN</a:t>
-            </a:r>
-          </a:p>
-          <a:p>
-            <a:pPr lvl="1"/>
-            <a:r>
-              <a:rPr lang="en-US" sz="2000" dirty="0" smtClean="0"/>
-              <a:t>Express Route</a:t>
-            </a:r>
-          </a:p>
-          <a:p>
-            <a:r>
-              <a:rPr lang="en-US" sz="2400" dirty="0" smtClean="0"/>
-              <a:t>Media &amp; CDN</a:t>
-            </a:r>
-          </a:p>
-          <a:p>
-            <a:pPr lvl="1"/>
-            <a:r>
-              <a:rPr lang="en-US" sz="2000" dirty="0" smtClean="0"/>
-              <a:t>Media Services</a:t>
-            </a:r>
-          </a:p>
-          <a:p>
-            <a:pPr lvl="1"/>
-            <a:r>
-              <a:rPr lang="en-US" sz="2000" dirty="0" smtClean="0"/>
-              <a:t>Full CDN</a:t>
-            </a:r>
-          </a:p>
-          <a:p>
-            <a:r>
-              <a:rPr lang="en-US" sz="2400" dirty="0" smtClean="0"/>
-              <a:t>Identity &amp; Access Management</a:t>
-            </a:r>
-          </a:p>
-          <a:p>
-            <a:pPr lvl="1"/>
-            <a:r>
-              <a:rPr lang="en-US" sz="2000" dirty="0" smtClean="0"/>
-              <a:t>Azure Active Directory</a:t>
-            </a:r>
-            <a:endParaRPr lang="en-US" sz="2000" dirty="0"/>
-          </a:p>
-        </p:txBody>
-      </p:sp>
-    </p:spTree>
-    <p:extLst>
-      <p:ext uri="{BB962C8B-B14F-4D97-AF65-F5344CB8AC3E}">
-        <p14:creationId xmlns:p14="http://schemas.microsoft.com/office/powerpoint/2010/main" val="1862137194"/>
-      </p:ext>
-    </p:extLst>
-  </p:cSld>
-  <p:clrMapOvr>
-    <a:masterClrMapping/>
-  </p:clrMapOvr>
-  <p:transition>
-    <p:fade/>
-  </p:transition>
-  <p:timing>
-    <p:tnLst>
-      <p:par>
-        <p:cTn id="1" dur="indefinite" restart="never" nodeType="tmRoot"/>
-      </p:par>
-    </p:tnLst>
-  </p:timing>
-</p:sld>
-</file>
-
-<file path=ppt/slides/slide14.xml><?xml version="1.0" encoding="utf-8"?>
-<p:sld xmlns:a="http://schemas.openxmlformats.org/drawingml/2006/main" xmlns:r="http://schemas.openxmlformats.org/officeDocument/2006/relationships" xmlns:p="http://schemas.openxmlformats.org/presentationml/2006/main">
-  <p:cSld>
-    <p:spTree>
-      <p:nvGrpSpPr>
-        <p:cNvPr id="1" name=""/>
-        <p:cNvGrpSpPr/>
-        <p:nvPr/>
-      </p:nvGrpSpPr>
-      <p:grpSpPr>
-        <a:xfrm>
-          <a:off x="0" y="0"/>
-          <a:ext cx="0" cy="0"/>
-          <a:chOff x="0" y="0"/>
-          <a:chExt cx="0" cy="0"/>
-        </a:xfrm>
-      </p:grpSpPr>
-      <p:sp>
-        <p:nvSpPr>
-          <p:cNvPr id="2" name="Title 1"/>
-          <p:cNvSpPr>
-            <a:spLocks noGrp="1"/>
-          </p:cNvSpPr>
-          <p:nvPr>
-            <p:ph type="title"/>
-          </p:nvPr>
-        </p:nvSpPr>
-        <p:spPr/>
-        <p:txBody>
-          <a:bodyPr/>
-          <a:lstStyle/>
-          <a:p>
-            <a:r>
-              <a:rPr lang="en-US" dirty="0" smtClean="0"/>
               <a:t>Azure Services Work Together</a:t>
             </a:r>
             <a:endParaRPr lang="en-US" dirty="0"/>
@@ -19750,7 +19447,7 @@
 </p:sld>
 </file>
 
-<file path=ppt/slides/slide15.xml><?xml version="1.0" encoding="utf-8"?>
+<file path=ppt/slides/slide14.xml><?xml version="1.0" encoding="utf-8"?>
 <p:sld xmlns:a="http://schemas.openxmlformats.org/drawingml/2006/main" xmlns:r="http://schemas.openxmlformats.org/officeDocument/2006/relationships" xmlns:p="http://schemas.openxmlformats.org/presentationml/2006/main">
   <p:cSld>
     <p:spTree>
@@ -19888,7 +19585,7 @@
 </p:sld>
 </file>
 
-<file path=ppt/slides/slide16.xml><?xml version="1.0" encoding="utf-8"?>
+<file path=ppt/slides/slide15.xml><?xml version="1.0" encoding="utf-8"?>
 <p:sld xmlns:a="http://schemas.openxmlformats.org/drawingml/2006/main" xmlns:r="http://schemas.openxmlformats.org/officeDocument/2006/relationships" xmlns:p="http://schemas.openxmlformats.org/presentationml/2006/main">
   <p:cSld>
     <p:spTree>
@@ -20001,7 +19698,7 @@
 </p:sld>
 </file>
 
-<file path=ppt/slides/slide17.xml><?xml version="1.0" encoding="utf-8"?>
+<file path=ppt/slides/slide16.xml><?xml version="1.0" encoding="utf-8"?>
 <p:sld xmlns:a="http://schemas.openxmlformats.org/drawingml/2006/main" xmlns:r="http://schemas.openxmlformats.org/officeDocument/2006/relationships" xmlns:p="http://schemas.openxmlformats.org/presentationml/2006/main">
   <p:cSld>
     <p:spTree>
@@ -20096,13 +19793,8 @@
           <a:p>
             <a:r>
               <a:rPr lang="en-US" dirty="0" smtClean="0"/>
-              <a:t>Key learning </a:t>
+              <a:t>Key learning objectives</a:t>
             </a:r>
-            <a:r>
-              <a:rPr lang="en-US" dirty="0" smtClean="0"/>
-              <a:t>objectives</a:t>
-            </a:r>
-            <a:endParaRPr lang="en-US" dirty="0" smtClean="0"/>
           </a:p>
           <a:p>
             <a:pPr lvl="1"/>
@@ -20217,15 +19909,7 @@
           <a:p>
             <a:r>
               <a:rPr lang="en-US" dirty="0" smtClean="0"/>
-              <a:t>What is the </a:t>
-            </a:r>
-            <a:r>
-              <a:rPr lang="en-US" dirty="0" smtClean="0"/>
-              <a:t>Cloud</a:t>
-            </a:r>
-            <a:r>
-              <a:rPr lang="en-US" dirty="0" smtClean="0"/>
-              <a:t>?</a:t>
+              <a:t>What is the Cloud?</a:t>
             </a:r>
             <a:endParaRPr lang="en-US" dirty="0"/>
           </a:p>
@@ -27937,8 +27621,25 @@
             <a:pPr lvl="1"/>
             <a:r>
               <a:rPr lang="en-US" dirty="0" smtClean="0"/>
-              <a:t>U. of TX, Austin, U. of CA, &amp; U. of IL, Urbana-Champaign</a:t>
+              <a:t>UT </a:t>
             </a:r>
+            <a:r>
+              <a:rPr lang="en-US" dirty="0" smtClean="0"/>
+              <a:t>Austin, </a:t>
+            </a:r>
+            <a:r>
+              <a:rPr lang="en-US" dirty="0" smtClean="0"/>
+              <a:t>UC Irvine, </a:t>
+            </a:r>
+            <a:r>
+              <a:rPr lang="en-US" dirty="0" smtClean="0"/>
+              <a:t>&amp; </a:t>
+            </a:r>
+            <a:r>
+              <a:rPr lang="en-US" dirty="0" smtClean="0"/>
+              <a:t>UI-UC</a:t>
+            </a:r>
+            <a:endParaRPr lang="en-US" dirty="0" smtClean="0"/>
           </a:p>
           <a:p>
             <a:pPr lvl="1"/>
@@ -28075,8 +27776,13 @@
             <a:pPr lvl="1"/>
             <a:r>
               <a:rPr lang="en-US" dirty="0" smtClean="0"/>
-              <a:t>Spun off from VENUS-C (EU funded project) at Newcastle U.</a:t>
+              <a:t>Spun off from VENUS-C (EU funded project) at Newcastle </a:t>
             </a:r>
+            <a:r>
+              <a:rPr lang="en-US" dirty="0" smtClean="0"/>
+              <a:t>University</a:t>
+            </a:r>
+            <a:endParaRPr lang="en-US" dirty="0" smtClean="0"/>
           </a:p>
           <a:p>
             <a:pPr lvl="1"/>
@@ -28191,7 +27897,7 @@
         <p:spPr>
           <a:xfrm>
             <a:off x="519248" y="1447800"/>
-            <a:ext cx="11151916" cy="4880054"/>
+            <a:ext cx="11151916" cy="4436984"/>
           </a:xfrm>
         </p:spPr>
         <p:txBody>
@@ -28207,7 +27913,11 @@
             <a:pPr lvl="1"/>
             <a:r>
               <a:rPr lang="en-US" dirty="0" smtClean="0"/>
-              <a:t>U. of WA, Tacoma</a:t>
+              <a:t>UW </a:t>
+            </a:r>
+            <a:r>
+              <a:rPr lang="en-US" dirty="0" smtClean="0"/>
+              <a:t>Tacoma</a:t>
             </a:r>
           </a:p>
           <a:p>
@@ -28241,13 +27951,8 @@
           <a:p>
             <a:r>
               <a:rPr lang="en-US" dirty="0" smtClean="0"/>
-              <a:t>Built entirely on Azure Machine </a:t>
+              <a:t>Built entirely on Azure Machine Learning</a:t>
             </a:r>
-            <a:r>
-              <a:rPr lang="en-US" dirty="0" smtClean="0"/>
-              <a:t>Learning</a:t>
-            </a:r>
-            <a:endParaRPr lang="en-US" dirty="0" smtClean="0"/>
           </a:p>
           <a:p>
             <a:pPr lvl="1"/>
@@ -28358,23 +28063,7 @@
           <a:p>
             <a:r>
               <a:rPr lang="en-US" dirty="0" smtClean="0"/>
-              <a:t>100% </a:t>
-            </a:r>
-            <a:r>
-              <a:rPr lang="en-US" dirty="0" smtClean="0"/>
-              <a:t>cross-platform </a:t>
-            </a:r>
-            <a:r>
-              <a:rPr lang="en-US" dirty="0" smtClean="0"/>
-              <a:t>with massive </a:t>
-            </a:r>
-            <a:r>
-              <a:rPr lang="en-US" dirty="0" smtClean="0"/>
-              <a:t>open-source </a:t>
-            </a:r>
-            <a:r>
-              <a:rPr lang="en-US" dirty="0" smtClean="0"/>
-              <a:t>support</a:t>
+              <a:t>100% cross-platform with massive open-source support</a:t>
             </a:r>
           </a:p>
         </p:txBody>

</xml_diff>